<commit_message>
Boulder Dash Java Project v1.1
</commit_message>
<xml_diff>
--- a/Boulder Dash Java Project.pptx
+++ b/Boulder Dash Java Project.pptx
@@ -4,6 +4,9 @@
   <p:sldMasterIdLst>
     <p:sldMasterId id="2147483648" r:id="rId1"/>
   </p:sldMasterIdLst>
+  <p:notesMasterIdLst>
+    <p:notesMasterId r:id="rId10"/>
+  </p:notesMasterIdLst>
   <p:sldIdLst>
     <p:sldId id="256" r:id="rId2"/>
     <p:sldId id="257" r:id="rId3"/>
@@ -123,6 +126,440 @@
 <p1510:revInfo xmlns:a="http://schemas.openxmlformats.org/drawingml/2006/main" xmlns:r="http://schemas.openxmlformats.org/officeDocument/2006/relationships" xmlns:p1510="http://schemas.microsoft.com/office/powerpoint/2015/10/main"/>
 </file>
 
+<file path=ppt/notesMasters/notesMaster1.xml><?xml version="1.0" encoding="utf-8"?>
+<p:notesMaster xmlns:a="http://schemas.openxmlformats.org/drawingml/2006/main" xmlns:r="http://schemas.openxmlformats.org/officeDocument/2006/relationships" xmlns:p="http://schemas.openxmlformats.org/presentationml/2006/main">
+  <p:cSld>
+    <p:bg>
+      <p:bgRef idx="1001">
+        <a:schemeClr val="bg1"/>
+      </p:bgRef>
+    </p:bg>
+    <p:spTree>
+      <p:nvGrpSpPr>
+        <p:cNvPr id="1" name=""/>
+        <p:cNvGrpSpPr/>
+        <p:nvPr/>
+      </p:nvGrpSpPr>
+      <p:grpSpPr>
+        <a:xfrm>
+          <a:off x="0" y="0"/>
+          <a:ext cx="0" cy="0"/>
+          <a:chOff x="0" y="0"/>
+          <a:chExt cx="0" cy="0"/>
+        </a:xfrm>
+      </p:grpSpPr>
+      <p:sp>
+        <p:nvSpPr>
+          <p:cNvPr id="2" name="Espace réservé de l'en-tête 1"/>
+          <p:cNvSpPr>
+            <a:spLocks noGrp="1"/>
+          </p:cNvSpPr>
+          <p:nvPr>
+            <p:ph type="hdr" sz="quarter"/>
+          </p:nvPr>
+        </p:nvSpPr>
+        <p:spPr>
+          <a:xfrm>
+            <a:off x="0" y="0"/>
+            <a:ext cx="2971800" cy="458788"/>
+          </a:xfrm>
+          <a:prstGeom prst="rect">
+            <a:avLst/>
+          </a:prstGeom>
+        </p:spPr>
+        <p:txBody>
+          <a:bodyPr vert="horz" lIns="91440" tIns="45720" rIns="91440" bIns="45720" rtlCol="0"/>
+          <a:lstStyle>
+            <a:lvl1pPr algn="l">
+              <a:defRPr sz="1200"/>
+            </a:lvl1pPr>
+          </a:lstStyle>
+          <a:p>
+            <a:endParaRPr lang="fr-FR"/>
+          </a:p>
+        </p:txBody>
+      </p:sp>
+      <p:sp>
+        <p:nvSpPr>
+          <p:cNvPr id="3" name="Espace réservé de la date 2"/>
+          <p:cNvSpPr>
+            <a:spLocks noGrp="1"/>
+          </p:cNvSpPr>
+          <p:nvPr>
+            <p:ph type="dt" idx="1"/>
+          </p:nvPr>
+        </p:nvSpPr>
+        <p:spPr>
+          <a:xfrm>
+            <a:off x="3884613" y="0"/>
+            <a:ext cx="2971800" cy="458788"/>
+          </a:xfrm>
+          <a:prstGeom prst="rect">
+            <a:avLst/>
+          </a:prstGeom>
+        </p:spPr>
+        <p:txBody>
+          <a:bodyPr vert="horz" lIns="91440" tIns="45720" rIns="91440" bIns="45720" rtlCol="0"/>
+          <a:lstStyle>
+            <a:lvl1pPr algn="r">
+              <a:defRPr sz="1200"/>
+            </a:lvl1pPr>
+          </a:lstStyle>
+          <a:p>
+            <a:fld id="{29C92D25-3641-460A-910E-9A66874189CD}" type="datetimeFigureOut">
+              <a:rPr lang="fr-FR" smtClean="0"/>
+              <a:t>26/06/2017</a:t>
+            </a:fld>
+            <a:endParaRPr lang="fr-FR"/>
+          </a:p>
+        </p:txBody>
+      </p:sp>
+      <p:sp>
+        <p:nvSpPr>
+          <p:cNvPr id="4" name="Espace réservé de l'image des diapositives 3"/>
+          <p:cNvSpPr>
+            <a:spLocks noGrp="1" noRot="1" noChangeAspect="1"/>
+          </p:cNvSpPr>
+          <p:nvPr>
+            <p:ph type="sldImg" idx="2"/>
+          </p:nvPr>
+        </p:nvSpPr>
+        <p:spPr>
+          <a:xfrm>
+            <a:off x="685800" y="1143000"/>
+            <a:ext cx="5486400" cy="3086100"/>
+          </a:xfrm>
+          <a:prstGeom prst="rect">
+            <a:avLst/>
+          </a:prstGeom>
+          <a:noFill/>
+          <a:ln w="12700">
+            <a:solidFill>
+              <a:prstClr val="black"/>
+            </a:solidFill>
+          </a:ln>
+        </p:spPr>
+        <p:txBody>
+          <a:bodyPr vert="horz" lIns="91440" tIns="45720" rIns="91440" bIns="45720" rtlCol="0" anchor="ctr"/>
+          <a:lstStyle/>
+          <a:p>
+            <a:endParaRPr lang="fr-FR"/>
+          </a:p>
+        </p:txBody>
+      </p:sp>
+      <p:sp>
+        <p:nvSpPr>
+          <p:cNvPr id="5" name="Espace réservé des commentaires 4"/>
+          <p:cNvSpPr>
+            <a:spLocks noGrp="1"/>
+          </p:cNvSpPr>
+          <p:nvPr>
+            <p:ph type="body" sz="quarter" idx="3"/>
+          </p:nvPr>
+        </p:nvSpPr>
+        <p:spPr>
+          <a:xfrm>
+            <a:off x="685800" y="4400550"/>
+            <a:ext cx="5486400" cy="3600450"/>
+          </a:xfrm>
+          <a:prstGeom prst="rect">
+            <a:avLst/>
+          </a:prstGeom>
+        </p:spPr>
+        <p:txBody>
+          <a:bodyPr vert="horz" lIns="91440" tIns="45720" rIns="91440" bIns="45720" rtlCol="0"/>
+          <a:lstStyle/>
+          <a:p>
+            <a:pPr lvl="0"/>
+            <a:r>
+              <a:rPr lang="fr-FR" smtClean="0"/>
+              <a:t>Modifiez les styles du texte du masque</a:t>
+            </a:r>
+          </a:p>
+          <a:p>
+            <a:pPr lvl="1"/>
+            <a:r>
+              <a:rPr lang="fr-FR" smtClean="0"/>
+              <a:t>Deuxième niveau</a:t>
+            </a:r>
+          </a:p>
+          <a:p>
+            <a:pPr lvl="2"/>
+            <a:r>
+              <a:rPr lang="fr-FR" smtClean="0"/>
+              <a:t>Troisième niveau</a:t>
+            </a:r>
+          </a:p>
+          <a:p>
+            <a:pPr lvl="3"/>
+            <a:r>
+              <a:rPr lang="fr-FR" smtClean="0"/>
+              <a:t>Quatrième niveau</a:t>
+            </a:r>
+          </a:p>
+          <a:p>
+            <a:pPr lvl="4"/>
+            <a:r>
+              <a:rPr lang="fr-FR" smtClean="0"/>
+              <a:t>Cinquième niveau</a:t>
+            </a:r>
+            <a:endParaRPr lang="fr-FR"/>
+          </a:p>
+        </p:txBody>
+      </p:sp>
+      <p:sp>
+        <p:nvSpPr>
+          <p:cNvPr id="6" name="Espace réservé du pied de page 5"/>
+          <p:cNvSpPr>
+            <a:spLocks noGrp="1"/>
+          </p:cNvSpPr>
+          <p:nvPr>
+            <p:ph type="ftr" sz="quarter" idx="4"/>
+          </p:nvPr>
+        </p:nvSpPr>
+        <p:spPr>
+          <a:xfrm>
+            <a:off x="0" y="8685213"/>
+            <a:ext cx="2971800" cy="458787"/>
+          </a:xfrm>
+          <a:prstGeom prst="rect">
+            <a:avLst/>
+          </a:prstGeom>
+        </p:spPr>
+        <p:txBody>
+          <a:bodyPr vert="horz" lIns="91440" tIns="45720" rIns="91440" bIns="45720" rtlCol="0" anchor="b"/>
+          <a:lstStyle>
+            <a:lvl1pPr algn="l">
+              <a:defRPr sz="1200"/>
+            </a:lvl1pPr>
+          </a:lstStyle>
+          <a:p>
+            <a:endParaRPr lang="fr-FR"/>
+          </a:p>
+        </p:txBody>
+      </p:sp>
+      <p:sp>
+        <p:nvSpPr>
+          <p:cNvPr id="7" name="Espace réservé du numéro de diapositive 6"/>
+          <p:cNvSpPr>
+            <a:spLocks noGrp="1"/>
+          </p:cNvSpPr>
+          <p:nvPr>
+            <p:ph type="sldNum" sz="quarter" idx="5"/>
+          </p:nvPr>
+        </p:nvSpPr>
+        <p:spPr>
+          <a:xfrm>
+            <a:off x="3884613" y="8685213"/>
+            <a:ext cx="2971800" cy="458787"/>
+          </a:xfrm>
+          <a:prstGeom prst="rect">
+            <a:avLst/>
+          </a:prstGeom>
+        </p:spPr>
+        <p:txBody>
+          <a:bodyPr vert="horz" lIns="91440" tIns="45720" rIns="91440" bIns="45720" rtlCol="0" anchor="b"/>
+          <a:lstStyle>
+            <a:lvl1pPr algn="r">
+              <a:defRPr sz="1200"/>
+            </a:lvl1pPr>
+          </a:lstStyle>
+          <a:p>
+            <a:fld id="{989F0881-0012-4052-92B3-179348F742DF}" type="slidenum">
+              <a:rPr lang="fr-FR" smtClean="0"/>
+              <a:t>‹N°›</a:t>
+            </a:fld>
+            <a:endParaRPr lang="fr-FR"/>
+          </a:p>
+        </p:txBody>
+      </p:sp>
+    </p:spTree>
+    <p:extLst>
+      <p:ext uri="{BB962C8B-B14F-4D97-AF65-F5344CB8AC3E}">
+        <p14:creationId xmlns:p14="http://schemas.microsoft.com/office/powerpoint/2010/main" val="1214028452"/>
+      </p:ext>
+    </p:extLst>
+  </p:cSld>
+  <p:clrMap bg1="lt1" tx1="dk1" bg2="lt2" tx2="dk2" accent1="accent1" accent2="accent2" accent3="accent3" accent4="accent4" accent5="accent5" accent6="accent6" hlink="hlink" folHlink="folHlink"/>
+  <p:notesStyle>
+    <a:lvl1pPr marL="0" algn="l" defTabSz="914400" rtl="0" eaLnBrk="1" latinLnBrk="0" hangingPunct="1">
+      <a:defRPr sz="1200" kern="1200">
+        <a:solidFill>
+          <a:schemeClr val="tx1"/>
+        </a:solidFill>
+        <a:latin typeface="+mn-lt"/>
+        <a:ea typeface="+mn-ea"/>
+        <a:cs typeface="+mn-cs"/>
+      </a:defRPr>
+    </a:lvl1pPr>
+    <a:lvl2pPr marL="457200" algn="l" defTabSz="914400" rtl="0" eaLnBrk="1" latinLnBrk="0" hangingPunct="1">
+      <a:defRPr sz="1200" kern="1200">
+        <a:solidFill>
+          <a:schemeClr val="tx1"/>
+        </a:solidFill>
+        <a:latin typeface="+mn-lt"/>
+        <a:ea typeface="+mn-ea"/>
+        <a:cs typeface="+mn-cs"/>
+      </a:defRPr>
+    </a:lvl2pPr>
+    <a:lvl3pPr marL="914400" algn="l" defTabSz="914400" rtl="0" eaLnBrk="1" latinLnBrk="0" hangingPunct="1">
+      <a:defRPr sz="1200" kern="1200">
+        <a:solidFill>
+          <a:schemeClr val="tx1"/>
+        </a:solidFill>
+        <a:latin typeface="+mn-lt"/>
+        <a:ea typeface="+mn-ea"/>
+        <a:cs typeface="+mn-cs"/>
+      </a:defRPr>
+    </a:lvl3pPr>
+    <a:lvl4pPr marL="1371600" algn="l" defTabSz="914400" rtl="0" eaLnBrk="1" latinLnBrk="0" hangingPunct="1">
+      <a:defRPr sz="1200" kern="1200">
+        <a:solidFill>
+          <a:schemeClr val="tx1"/>
+        </a:solidFill>
+        <a:latin typeface="+mn-lt"/>
+        <a:ea typeface="+mn-ea"/>
+        <a:cs typeface="+mn-cs"/>
+      </a:defRPr>
+    </a:lvl4pPr>
+    <a:lvl5pPr marL="1828800" algn="l" defTabSz="914400" rtl="0" eaLnBrk="1" latinLnBrk="0" hangingPunct="1">
+      <a:defRPr sz="1200" kern="1200">
+        <a:solidFill>
+          <a:schemeClr val="tx1"/>
+        </a:solidFill>
+        <a:latin typeface="+mn-lt"/>
+        <a:ea typeface="+mn-ea"/>
+        <a:cs typeface="+mn-cs"/>
+      </a:defRPr>
+    </a:lvl5pPr>
+    <a:lvl6pPr marL="2286000" algn="l" defTabSz="914400" rtl="0" eaLnBrk="1" latinLnBrk="0" hangingPunct="1">
+      <a:defRPr sz="1200" kern="1200">
+        <a:solidFill>
+          <a:schemeClr val="tx1"/>
+        </a:solidFill>
+        <a:latin typeface="+mn-lt"/>
+        <a:ea typeface="+mn-ea"/>
+        <a:cs typeface="+mn-cs"/>
+      </a:defRPr>
+    </a:lvl6pPr>
+    <a:lvl7pPr marL="2743200" algn="l" defTabSz="914400" rtl="0" eaLnBrk="1" latinLnBrk="0" hangingPunct="1">
+      <a:defRPr sz="1200" kern="1200">
+        <a:solidFill>
+          <a:schemeClr val="tx1"/>
+        </a:solidFill>
+        <a:latin typeface="+mn-lt"/>
+        <a:ea typeface="+mn-ea"/>
+        <a:cs typeface="+mn-cs"/>
+      </a:defRPr>
+    </a:lvl7pPr>
+    <a:lvl8pPr marL="3200400" algn="l" defTabSz="914400" rtl="0" eaLnBrk="1" latinLnBrk="0" hangingPunct="1">
+      <a:defRPr sz="1200" kern="1200">
+        <a:solidFill>
+          <a:schemeClr val="tx1"/>
+        </a:solidFill>
+        <a:latin typeface="+mn-lt"/>
+        <a:ea typeface="+mn-ea"/>
+        <a:cs typeface="+mn-cs"/>
+      </a:defRPr>
+    </a:lvl8pPr>
+    <a:lvl9pPr marL="3657600" algn="l" defTabSz="914400" rtl="0" eaLnBrk="1" latinLnBrk="0" hangingPunct="1">
+      <a:defRPr sz="1200" kern="1200">
+        <a:solidFill>
+          <a:schemeClr val="tx1"/>
+        </a:solidFill>
+        <a:latin typeface="+mn-lt"/>
+        <a:ea typeface="+mn-ea"/>
+        <a:cs typeface="+mn-cs"/>
+      </a:defRPr>
+    </a:lvl9pPr>
+  </p:notesStyle>
+</p:notesMaster>
+</file>
+
+<file path=ppt/notesSlides/notesSlide1.xml><?xml version="1.0" encoding="utf-8"?>
+<p:notes xmlns:a="http://schemas.openxmlformats.org/drawingml/2006/main" xmlns:r="http://schemas.openxmlformats.org/officeDocument/2006/relationships" xmlns:p="http://schemas.openxmlformats.org/presentationml/2006/main">
+  <p:cSld>
+    <p:spTree>
+      <p:nvGrpSpPr>
+        <p:cNvPr id="1" name=""/>
+        <p:cNvGrpSpPr/>
+        <p:nvPr/>
+      </p:nvGrpSpPr>
+      <p:grpSpPr>
+        <a:xfrm>
+          <a:off x="0" y="0"/>
+          <a:ext cx="0" cy="0"/>
+          <a:chOff x="0" y="0"/>
+          <a:chExt cx="0" cy="0"/>
+        </a:xfrm>
+      </p:grpSpPr>
+      <p:sp>
+        <p:nvSpPr>
+          <p:cNvPr id="2" name="Espace réservé de l'image des diapositives 1"/>
+          <p:cNvSpPr>
+            <a:spLocks noGrp="1" noRot="1" noChangeAspect="1"/>
+          </p:cNvSpPr>
+          <p:nvPr>
+            <p:ph type="sldImg"/>
+          </p:nvPr>
+        </p:nvSpPr>
+        <p:spPr/>
+      </p:sp>
+      <p:sp>
+        <p:nvSpPr>
+          <p:cNvPr id="3" name="Espace réservé des commentaires 2"/>
+          <p:cNvSpPr>
+            <a:spLocks noGrp="1"/>
+          </p:cNvSpPr>
+          <p:nvPr>
+            <p:ph type="body" idx="1"/>
+          </p:nvPr>
+        </p:nvSpPr>
+        <p:spPr/>
+        <p:txBody>
+          <a:bodyPr/>
+          <a:lstStyle/>
+          <a:p>
+            <a:endParaRPr lang="fr-FR"/>
+          </a:p>
+        </p:txBody>
+      </p:sp>
+      <p:sp>
+        <p:nvSpPr>
+          <p:cNvPr id="4" name="Espace réservé du numéro de diapositive 3"/>
+          <p:cNvSpPr>
+            <a:spLocks noGrp="1"/>
+          </p:cNvSpPr>
+          <p:nvPr>
+            <p:ph type="sldNum" sz="quarter" idx="10"/>
+          </p:nvPr>
+        </p:nvSpPr>
+        <p:spPr/>
+        <p:txBody>
+          <a:bodyPr/>
+          <a:lstStyle/>
+          <a:p>
+            <a:fld id="{989F0881-0012-4052-92B3-179348F742DF}" type="slidenum">
+              <a:rPr lang="fr-FR" smtClean="0"/>
+              <a:t>1</a:t>
+            </a:fld>
+            <a:endParaRPr lang="fr-FR"/>
+          </a:p>
+        </p:txBody>
+      </p:sp>
+    </p:spTree>
+    <p:extLst>
+      <p:ext uri="{BB962C8B-B14F-4D97-AF65-F5344CB8AC3E}">
+        <p14:creationId xmlns:p14="http://schemas.microsoft.com/office/powerpoint/2010/main" val="448322941"/>
+      </p:ext>
+    </p:extLst>
+  </p:cSld>
+  <p:clrMapOvr>
+    <a:masterClrMapping/>
+  </p:clrMapOvr>
+</p:notes>
+</file>
+
 <file path=ppt/slideLayouts/slideLayout1.xml><?xml version="1.0" encoding="utf-8"?>
 <p:sldLayout xmlns:a="http://schemas.openxmlformats.org/drawingml/2006/main" xmlns:r="http://schemas.openxmlformats.org/officeDocument/2006/relationships" xmlns:p="http://schemas.openxmlformats.org/presentationml/2006/main" type="title" preserve="1">
   <p:cSld name="Diapositive de titre">
@@ -312,7 +749,7 @@
             <a:fld id="{B61BEF0D-F0BB-DE4B-95CE-6DB70DBA9567}" type="datetimeFigureOut">
               <a:rPr lang="en-US" dirty="0"/>
               <a:pPr/>
-              <a:t>6/25/2017</a:t>
+              <a:t>6/26/2017</a:t>
             </a:fld>
             <a:endParaRPr lang="en-US" dirty="0"/>
           </a:p>
@@ -647,7 +1084,7 @@
             <a:fld id="{B61BEF0D-F0BB-DE4B-95CE-6DB70DBA9567}" type="datetimeFigureOut">
               <a:rPr lang="en-US" dirty="0"/>
               <a:pPr/>
-              <a:t>6/25/2017</a:t>
+              <a:t>6/26/2017</a:t>
             </a:fld>
             <a:endParaRPr lang="en-US" dirty="0"/>
           </a:p>
@@ -1045,7 +1482,7 @@
             <a:fld id="{B61BEF0D-F0BB-DE4B-95CE-6DB70DBA9567}" type="datetimeFigureOut">
               <a:rPr lang="en-US" dirty="0"/>
               <a:pPr/>
-              <a:t>6/25/2017</a:t>
+              <a:t>6/26/2017</a:t>
             </a:fld>
             <a:endParaRPr lang="en-US" dirty="0"/>
           </a:p>
@@ -1377,7 +1814,7 @@
             <a:fld id="{B61BEF0D-F0BB-DE4B-95CE-6DB70DBA9567}" type="datetimeFigureOut">
               <a:rPr lang="en-US" dirty="0"/>
               <a:pPr/>
-              <a:t>6/25/2017</a:t>
+              <a:t>6/26/2017</a:t>
             </a:fld>
             <a:endParaRPr lang="en-US" dirty="0"/>
           </a:p>
@@ -1694,7 +2131,7 @@
             <a:fld id="{B61BEF0D-F0BB-DE4B-95CE-6DB70DBA9567}" type="datetimeFigureOut">
               <a:rPr lang="en-US" dirty="0"/>
               <a:pPr/>
-              <a:t>6/25/2017</a:t>
+              <a:t>6/26/2017</a:t>
             </a:fld>
             <a:endParaRPr lang="en-US" dirty="0"/>
           </a:p>
@@ -2087,7 +2524,7 @@
             <a:fld id="{B61BEF0D-F0BB-DE4B-95CE-6DB70DBA9567}" type="datetimeFigureOut">
               <a:rPr lang="en-US" dirty="0"/>
               <a:pPr/>
-              <a:t>6/25/2017</a:t>
+              <a:t>6/26/2017</a:t>
             </a:fld>
             <a:endParaRPr lang="en-US" dirty="0"/>
           </a:p>
@@ -2341,7 +2778,7 @@
             <a:fld id="{B61BEF0D-F0BB-DE4B-95CE-6DB70DBA9567}" type="datetimeFigureOut">
               <a:rPr lang="en-US" dirty="0"/>
               <a:pPr/>
-              <a:t>6/25/2017</a:t>
+              <a:t>6/26/2017</a:t>
             </a:fld>
             <a:endParaRPr lang="en-US" dirty="0"/>
           </a:p>
@@ -2600,7 +3037,7 @@
             <a:fld id="{B61BEF0D-F0BB-DE4B-95CE-6DB70DBA9567}" type="datetimeFigureOut">
               <a:rPr lang="en-US" dirty="0"/>
               <a:pPr/>
-              <a:t>6/25/2017</a:t>
+              <a:t>6/26/2017</a:t>
             </a:fld>
             <a:endParaRPr lang="en-US" dirty="0"/>
           </a:p>
@@ -2859,7 +3296,7 @@
             <a:fld id="{B61BEF0D-F0BB-DE4B-95CE-6DB70DBA9567}" type="datetimeFigureOut">
               <a:rPr lang="en-US" dirty="0"/>
               <a:pPr/>
-              <a:t>6/25/2017</a:t>
+              <a:t>6/26/2017</a:t>
             </a:fld>
             <a:endParaRPr lang="en-US" dirty="0"/>
           </a:p>
@@ -3185,7 +3622,7 @@
             <a:fld id="{B61BEF0D-F0BB-DE4B-95CE-6DB70DBA9567}" type="datetimeFigureOut">
               <a:rPr lang="en-US" dirty="0"/>
               <a:pPr/>
-              <a:t>6/25/2017</a:t>
+              <a:t>6/26/2017</a:t>
             </a:fld>
             <a:endParaRPr lang="en-US" dirty="0"/>
           </a:p>
@@ -3505,7 +3942,7 @@
             <a:fld id="{B61BEF0D-F0BB-DE4B-95CE-6DB70DBA9567}" type="datetimeFigureOut">
               <a:rPr lang="en-US" dirty="0"/>
               <a:pPr/>
-              <a:t>6/25/2017</a:t>
+              <a:t>6/26/2017</a:t>
             </a:fld>
             <a:endParaRPr lang="en-US" dirty="0"/>
           </a:p>
@@ -3959,7 +4396,7 @@
             <a:fld id="{B61BEF0D-F0BB-DE4B-95CE-6DB70DBA9567}" type="datetimeFigureOut">
               <a:rPr lang="en-US" dirty="0"/>
               <a:pPr/>
-              <a:t>6/25/2017</a:t>
+              <a:t>6/26/2017</a:t>
             </a:fld>
             <a:endParaRPr lang="en-US" dirty="0"/>
           </a:p>
@@ -4161,7 +4598,7 @@
             <a:fld id="{B61BEF0D-F0BB-DE4B-95CE-6DB70DBA9567}" type="datetimeFigureOut">
               <a:rPr lang="en-US" dirty="0"/>
               <a:pPr/>
-              <a:t>6/25/2017</a:t>
+              <a:t>6/26/2017</a:t>
             </a:fld>
             <a:endParaRPr lang="en-US" dirty="0"/>
           </a:p>
@@ -4335,7 +4772,7 @@
             <a:fld id="{B61BEF0D-F0BB-DE4B-95CE-6DB70DBA9567}" type="datetimeFigureOut">
               <a:rPr lang="en-US" dirty="0"/>
               <a:pPr/>
-              <a:t>6/25/2017</a:t>
+              <a:t>6/26/2017</a:t>
             </a:fld>
             <a:endParaRPr lang="en-US" dirty="0"/>
           </a:p>
@@ -4665,7 +5102,7 @@
             <a:fld id="{B61BEF0D-F0BB-DE4B-95CE-6DB70DBA9567}" type="datetimeFigureOut">
               <a:rPr lang="en-US" dirty="0"/>
               <a:pPr/>
-              <a:t>6/25/2017</a:t>
+              <a:t>6/26/2017</a:t>
             </a:fld>
             <a:endParaRPr lang="en-US" dirty="0"/>
           </a:p>
@@ -5007,7 +5444,7 @@
             <a:fld id="{B61BEF0D-F0BB-DE4B-95CE-6DB70DBA9567}" type="datetimeFigureOut">
               <a:rPr lang="en-US" dirty="0"/>
               <a:pPr/>
-              <a:t>6/25/2017</a:t>
+              <a:t>6/26/2017</a:t>
             </a:fld>
             <a:endParaRPr lang="en-US" dirty="0"/>
           </a:p>
@@ -7121,7 +7558,7 @@
             <a:fld id="{B61BEF0D-F0BB-DE4B-95CE-6DB70DBA9567}" type="datetimeFigureOut">
               <a:rPr lang="en-US" dirty="0"/>
               <a:pPr/>
-              <a:t>6/25/2017</a:t>
+              <a:t>6/26/2017</a:t>
             </a:fld>
             <a:endParaRPr lang="en-US" dirty="0"/>
           </a:p>
@@ -7640,7 +8077,7 @@
           <p:cNvPr id="2" name="Titre 1">
             <a:extLst>
               <a:ext uri="{FF2B5EF4-FFF2-40B4-BE49-F238E27FC236}">
-                <a16:creationId xmlns:a16="http://schemas.microsoft.com/office/drawing/2014/main" id="{A41FA085-563B-409C-ACF8-980AC7489436}"/>
+                <a16:creationId xmlns:a16="http://schemas.microsoft.com/office/drawing/2014/main" xmlns="" id="{A41FA085-563B-409C-ACF8-980AC7489436}"/>
               </a:ext>
             </a:extLst>
           </p:cNvPr>
@@ -7668,7 +8105,7 @@
           <p:cNvPr id="3" name="Sous-titre 2">
             <a:extLst>
               <a:ext uri="{FF2B5EF4-FFF2-40B4-BE49-F238E27FC236}">
-                <a16:creationId xmlns:a16="http://schemas.microsoft.com/office/drawing/2014/main" id="{DE100E32-2EE7-4AAE-9828-9AA8975D209C}"/>
+                <a16:creationId xmlns:a16="http://schemas.microsoft.com/office/drawing/2014/main" xmlns="" id="{DE100E32-2EE7-4AAE-9828-9AA8975D209C}"/>
               </a:ext>
             </a:extLst>
           </p:cNvPr>
@@ -7700,6 +8137,70 @@
               <a:rPr lang="en-US" dirty="0" err="1"/>
               <a:t>Burlet</a:t>
             </a:r>
+            <a:endParaRPr lang="en-US" dirty="0"/>
+          </a:p>
+        </p:txBody>
+      </p:sp>
+      <p:pic>
+        <p:nvPicPr>
+          <p:cNvPr id="4" name="Image 3"/>
+          <p:cNvPicPr>
+            <a:picLocks noChangeAspect="1"/>
+          </p:cNvPicPr>
+          <p:nvPr/>
+        </p:nvPicPr>
+        <p:blipFill>
+          <a:blip r:embed="rId3">
+            <a:extLst>
+              <a:ext uri="{28A0092B-C50C-407E-A947-70E740481C1C}">
+                <a14:useLocalDpi xmlns:a14="http://schemas.microsoft.com/office/drawing/2010/main" val="0"/>
+              </a:ext>
+            </a:extLst>
+          </a:blip>
+          <a:stretch>
+            <a:fillRect/>
+          </a:stretch>
+        </p:blipFill>
+        <p:spPr>
+          <a:xfrm>
+            <a:off x="10170455" y="136168"/>
+            <a:ext cx="1883304" cy="984178"/>
+          </a:xfrm>
+          <a:prstGeom prst="rect">
+            <a:avLst/>
+          </a:prstGeom>
+          <a:ln>
+            <a:noFill/>
+          </a:ln>
+          <a:effectLst>
+            <a:outerShdw blurRad="190500" algn="tl" rotWithShape="0">
+              <a:srgbClr val="000000">
+                <a:alpha val="70000"/>
+              </a:srgbClr>
+            </a:outerShdw>
+          </a:effectLst>
+        </p:spPr>
+      </p:pic>
+      <p:sp>
+        <p:nvSpPr>
+          <p:cNvPr id="5" name="Espace réservé du numéro de diapositive 4"/>
+          <p:cNvSpPr>
+            <a:spLocks noGrp="1"/>
+          </p:cNvSpPr>
+          <p:nvPr>
+            <p:ph type="sldNum" sz="quarter" idx="12"/>
+          </p:nvPr>
+        </p:nvSpPr>
+        <p:spPr/>
+        <p:txBody>
+          <a:bodyPr/>
+          <a:lstStyle/>
+          <a:p>
+            <a:fld id="{D57F1E4F-1CFF-5643-939E-217C01CDF565}" type="slidenum">
+              <a:rPr lang="en-US" smtClean="0"/>
+              <a:pPr/>
+              <a:t>1</a:t>
+            </a:fld>
             <a:endParaRPr lang="en-US" dirty="0"/>
           </a:p>
         </p:txBody>
@@ -7714,6 +8215,25 @@
   <p:clrMapOvr>
     <a:masterClrMapping/>
   </p:clrMapOvr>
+  <mc:AlternateContent xmlns:mc="http://schemas.openxmlformats.org/markup-compatibility/2006">
+    <mc:Choice xmlns:p14="http://schemas.microsoft.com/office/powerpoint/2010/main" Requires="p14">
+      <p:transition spd="med" p14:dur="700">
+        <p:fade/>
+      </p:transition>
+    </mc:Choice>
+    <mc:Fallback>
+      <p:transition spd="med">
+        <p:fade/>
+      </p:transition>
+    </mc:Fallback>
+  </mc:AlternateContent>
+  <p:timing>
+    <p:tnLst>
+      <p:par>
+        <p:cTn id="1" dur="indefinite" restart="never" nodeType="tmRoot"/>
+      </p:par>
+    </p:tnLst>
+  </p:timing>
 </p:sld>
 </file>
 
@@ -7739,7 +8259,7 @@
           <p:cNvPr id="2" name="Titre 1">
             <a:extLst>
               <a:ext uri="{FF2B5EF4-FFF2-40B4-BE49-F238E27FC236}">
-                <a16:creationId xmlns:a16="http://schemas.microsoft.com/office/drawing/2014/main" id="{AED4D63A-0491-4BBA-A260-30215E135C89}"/>
+                <a16:creationId xmlns:a16="http://schemas.microsoft.com/office/drawing/2014/main" xmlns="" id="{AED4D63A-0491-4BBA-A260-30215E135C89}"/>
               </a:ext>
             </a:extLst>
           </p:cNvPr>
@@ -7767,7 +8287,7 @@
           <p:cNvPr id="3" name="Espace réservé du contenu 2">
             <a:extLst>
               <a:ext uri="{FF2B5EF4-FFF2-40B4-BE49-F238E27FC236}">
-                <a16:creationId xmlns:a16="http://schemas.microsoft.com/office/drawing/2014/main" id="{6C3D1B59-A0D9-49E2-ACF6-E2E7B471D36D}"/>
+                <a16:creationId xmlns:a16="http://schemas.microsoft.com/office/drawing/2014/main" xmlns="" id="{6C3D1B59-A0D9-49E2-ACF6-E2E7B471D36D}"/>
               </a:ext>
             </a:extLst>
           </p:cNvPr>
@@ -7836,7 +8356,7 @@
           <p:cNvPr id="6" name="Image 5" descr="Une image contenant texte&#10;&#10;Description générée avec un niveau de confiance très élevé">
             <a:extLst>
               <a:ext uri="{FF2B5EF4-FFF2-40B4-BE49-F238E27FC236}">
-                <a16:creationId xmlns:a16="http://schemas.microsoft.com/office/drawing/2014/main" id="{7BC199B3-29C8-4EF1-8426-7EF96C165054}"/>
+                <a16:creationId xmlns:a16="http://schemas.microsoft.com/office/drawing/2014/main" xmlns="" id="{7BC199B3-29C8-4EF1-8426-7EF96C165054}"/>
               </a:ext>
             </a:extLst>
           </p:cNvPr>
@@ -7869,6 +8389,70 @@
           </a:effectLst>
         </p:spPr>
       </p:pic>
+      <p:pic>
+        <p:nvPicPr>
+          <p:cNvPr id="5" name="Image 4"/>
+          <p:cNvPicPr>
+            <a:picLocks noChangeAspect="1"/>
+          </p:cNvPicPr>
+          <p:nvPr/>
+        </p:nvPicPr>
+        <p:blipFill>
+          <a:blip r:embed="rId3">
+            <a:extLst>
+              <a:ext uri="{28A0092B-C50C-407E-A947-70E740481C1C}">
+                <a14:useLocalDpi xmlns:a14="http://schemas.microsoft.com/office/drawing/2010/main" val="0"/>
+              </a:ext>
+            </a:extLst>
+          </a:blip>
+          <a:stretch>
+            <a:fillRect/>
+          </a:stretch>
+        </p:blipFill>
+        <p:spPr>
+          <a:xfrm>
+            <a:off x="285050" y="5713184"/>
+            <a:ext cx="1883304" cy="984178"/>
+          </a:xfrm>
+          <a:prstGeom prst="rect">
+            <a:avLst/>
+          </a:prstGeom>
+          <a:ln>
+            <a:noFill/>
+          </a:ln>
+          <a:effectLst>
+            <a:outerShdw blurRad="190500" algn="tl" rotWithShape="0">
+              <a:srgbClr val="000000">
+                <a:alpha val="70000"/>
+              </a:srgbClr>
+            </a:outerShdw>
+          </a:effectLst>
+        </p:spPr>
+      </p:pic>
+      <p:sp>
+        <p:nvSpPr>
+          <p:cNvPr id="4" name="Espace réservé du numéro de diapositive 3"/>
+          <p:cNvSpPr>
+            <a:spLocks noGrp="1"/>
+          </p:cNvSpPr>
+          <p:nvPr>
+            <p:ph type="sldNum" sz="quarter" idx="12"/>
+          </p:nvPr>
+        </p:nvSpPr>
+        <p:spPr/>
+        <p:txBody>
+          <a:bodyPr/>
+          <a:lstStyle/>
+          <a:p>
+            <a:fld id="{D57F1E4F-1CFF-5643-939E-217C01CDF565}" type="slidenum">
+              <a:rPr lang="en-US" smtClean="0"/>
+              <a:pPr/>
+              <a:t>2</a:t>
+            </a:fld>
+            <a:endParaRPr lang="en-US" dirty="0"/>
+          </a:p>
+        </p:txBody>
+      </p:sp>
     </p:spTree>
     <p:extLst>
       <p:ext uri="{BB962C8B-B14F-4D97-AF65-F5344CB8AC3E}">
@@ -7879,6 +8463,25 @@
   <p:clrMapOvr>
     <a:masterClrMapping/>
   </p:clrMapOvr>
+  <mc:AlternateContent xmlns:mc="http://schemas.openxmlformats.org/markup-compatibility/2006">
+    <mc:Choice xmlns:p14="http://schemas.microsoft.com/office/powerpoint/2010/main" Requires="p14">
+      <p:transition spd="med" p14:dur="700">
+        <p:fade/>
+      </p:transition>
+    </mc:Choice>
+    <mc:Fallback>
+      <p:transition spd="med">
+        <p:fade/>
+      </p:transition>
+    </mc:Fallback>
+  </mc:AlternateContent>
+  <p:timing>
+    <p:tnLst>
+      <p:par>
+        <p:cTn id="1" dur="indefinite" restart="never" nodeType="tmRoot"/>
+      </p:par>
+    </p:tnLst>
+  </p:timing>
 </p:sld>
 </file>
 
@@ -7904,7 +8507,7 @@
           <p:cNvPr id="2" name="Titre 1">
             <a:extLst>
               <a:ext uri="{FF2B5EF4-FFF2-40B4-BE49-F238E27FC236}">
-                <a16:creationId xmlns:a16="http://schemas.microsoft.com/office/drawing/2014/main" id="{F9D4DC50-378B-428A-AAC3-61881E6BF9A8}"/>
+                <a16:creationId xmlns:a16="http://schemas.microsoft.com/office/drawing/2014/main" xmlns="" id="{F9D4DC50-378B-428A-AAC3-61881E6BF9A8}"/>
               </a:ext>
             </a:extLst>
           </p:cNvPr>
@@ -7932,7 +8535,7 @@
           <p:cNvPr id="3" name="Espace réservé du contenu 2">
             <a:extLst>
               <a:ext uri="{FF2B5EF4-FFF2-40B4-BE49-F238E27FC236}">
-                <a16:creationId xmlns:a16="http://schemas.microsoft.com/office/drawing/2014/main" id="{40FF578C-9D68-4770-9A5A-75F77565F414}"/>
+                <a16:creationId xmlns:a16="http://schemas.microsoft.com/office/drawing/2014/main" xmlns="" id="{40FF578C-9D68-4770-9A5A-75F77565F414}"/>
               </a:ext>
             </a:extLst>
           </p:cNvPr>
@@ -7982,6 +8585,70 @@
               <a:rPr lang="en-US" dirty="0"/>
               <a:t>2016 release on PC</a:t>
             </a:r>
+          </a:p>
+        </p:txBody>
+      </p:sp>
+      <p:pic>
+        <p:nvPicPr>
+          <p:cNvPr id="4" name="Image 3"/>
+          <p:cNvPicPr>
+            <a:picLocks noChangeAspect="1"/>
+          </p:cNvPicPr>
+          <p:nvPr/>
+        </p:nvPicPr>
+        <p:blipFill>
+          <a:blip r:embed="rId2">
+            <a:extLst>
+              <a:ext uri="{28A0092B-C50C-407E-A947-70E740481C1C}">
+                <a14:useLocalDpi xmlns:a14="http://schemas.microsoft.com/office/drawing/2010/main" val="0"/>
+              </a:ext>
+            </a:extLst>
+          </a:blip>
+          <a:stretch>
+            <a:fillRect/>
+          </a:stretch>
+        </p:blipFill>
+        <p:spPr>
+          <a:xfrm>
+            <a:off x="285050" y="5713184"/>
+            <a:ext cx="1883304" cy="984178"/>
+          </a:xfrm>
+          <a:prstGeom prst="rect">
+            <a:avLst/>
+          </a:prstGeom>
+          <a:ln>
+            <a:noFill/>
+          </a:ln>
+          <a:effectLst>
+            <a:outerShdw blurRad="190500" algn="tl" rotWithShape="0">
+              <a:srgbClr val="000000">
+                <a:alpha val="70000"/>
+              </a:srgbClr>
+            </a:outerShdw>
+          </a:effectLst>
+        </p:spPr>
+      </p:pic>
+      <p:sp>
+        <p:nvSpPr>
+          <p:cNvPr id="5" name="Espace réservé du numéro de diapositive 4"/>
+          <p:cNvSpPr>
+            <a:spLocks noGrp="1"/>
+          </p:cNvSpPr>
+          <p:nvPr>
+            <p:ph type="sldNum" sz="quarter" idx="12"/>
+          </p:nvPr>
+        </p:nvSpPr>
+        <p:spPr/>
+        <p:txBody>
+          <a:bodyPr/>
+          <a:lstStyle/>
+          <a:p>
+            <a:fld id="{D57F1E4F-1CFF-5643-939E-217C01CDF565}" type="slidenum">
+              <a:rPr lang="en-US" smtClean="0"/>
+              <a:pPr/>
+              <a:t>3</a:t>
+            </a:fld>
+            <a:endParaRPr lang="en-US" dirty="0"/>
           </a:p>
         </p:txBody>
       </p:sp>
@@ -7995,6 +8662,25 @@
   <p:clrMapOvr>
     <a:masterClrMapping/>
   </p:clrMapOvr>
+  <mc:AlternateContent xmlns:mc="http://schemas.openxmlformats.org/markup-compatibility/2006">
+    <mc:Choice xmlns:p14="http://schemas.microsoft.com/office/powerpoint/2010/main" Requires="p14">
+      <p:transition spd="med" p14:dur="700">
+        <p:fade/>
+      </p:transition>
+    </mc:Choice>
+    <mc:Fallback>
+      <p:transition spd="med">
+        <p:fade/>
+      </p:transition>
+    </mc:Fallback>
+  </mc:AlternateContent>
+  <p:timing>
+    <p:tnLst>
+      <p:par>
+        <p:cTn id="1" dur="indefinite" restart="never" nodeType="tmRoot"/>
+      </p:par>
+    </p:tnLst>
+  </p:timing>
 </p:sld>
 </file>
 
@@ -8020,7 +8706,7 @@
           <p:cNvPr id="2" name="Titre 1">
             <a:extLst>
               <a:ext uri="{FF2B5EF4-FFF2-40B4-BE49-F238E27FC236}">
-                <a16:creationId xmlns:a16="http://schemas.microsoft.com/office/drawing/2014/main" id="{80442A32-DAAA-4689-A4EC-0B45008BD46A}"/>
+                <a16:creationId xmlns:a16="http://schemas.microsoft.com/office/drawing/2014/main" xmlns="" id="{80442A32-DAAA-4689-A4EC-0B45008BD46A}"/>
               </a:ext>
             </a:extLst>
           </p:cNvPr>
@@ -8048,7 +8734,7 @@
           <p:cNvPr id="3" name="Espace réservé du contenu 2">
             <a:extLst>
               <a:ext uri="{FF2B5EF4-FFF2-40B4-BE49-F238E27FC236}">
-                <a16:creationId xmlns:a16="http://schemas.microsoft.com/office/drawing/2014/main" id="{0F89B193-AE89-461B-A710-2C5592FC61CB}"/>
+                <a16:creationId xmlns:a16="http://schemas.microsoft.com/office/drawing/2014/main" xmlns="" id="{0F89B193-AE89-461B-A710-2C5592FC61CB}"/>
               </a:ext>
             </a:extLst>
           </p:cNvPr>
@@ -8118,6 +8804,70 @@
               <a:rPr lang="en-US" dirty="0"/>
               <a:t>When the player is hit by a boulder or an enemy is dead</a:t>
             </a:r>
+          </a:p>
+        </p:txBody>
+      </p:sp>
+      <p:pic>
+        <p:nvPicPr>
+          <p:cNvPr id="4" name="Image 3"/>
+          <p:cNvPicPr>
+            <a:picLocks noChangeAspect="1"/>
+          </p:cNvPicPr>
+          <p:nvPr/>
+        </p:nvPicPr>
+        <p:blipFill>
+          <a:blip r:embed="rId2">
+            <a:extLst>
+              <a:ext uri="{28A0092B-C50C-407E-A947-70E740481C1C}">
+                <a14:useLocalDpi xmlns:a14="http://schemas.microsoft.com/office/drawing/2010/main" val="0"/>
+              </a:ext>
+            </a:extLst>
+          </a:blip>
+          <a:stretch>
+            <a:fillRect/>
+          </a:stretch>
+        </p:blipFill>
+        <p:spPr>
+          <a:xfrm>
+            <a:off x="285050" y="5713184"/>
+            <a:ext cx="1883304" cy="984178"/>
+          </a:xfrm>
+          <a:prstGeom prst="rect">
+            <a:avLst/>
+          </a:prstGeom>
+          <a:ln>
+            <a:noFill/>
+          </a:ln>
+          <a:effectLst>
+            <a:outerShdw blurRad="190500" algn="tl" rotWithShape="0">
+              <a:srgbClr val="000000">
+                <a:alpha val="70000"/>
+              </a:srgbClr>
+            </a:outerShdw>
+          </a:effectLst>
+        </p:spPr>
+      </p:pic>
+      <p:sp>
+        <p:nvSpPr>
+          <p:cNvPr id="5" name="Espace réservé du numéro de diapositive 4"/>
+          <p:cNvSpPr>
+            <a:spLocks noGrp="1"/>
+          </p:cNvSpPr>
+          <p:nvPr>
+            <p:ph type="sldNum" sz="quarter" idx="12"/>
+          </p:nvPr>
+        </p:nvSpPr>
+        <p:spPr/>
+        <p:txBody>
+          <a:bodyPr/>
+          <a:lstStyle/>
+          <a:p>
+            <a:fld id="{D57F1E4F-1CFF-5643-939E-217C01CDF565}" type="slidenum">
+              <a:rPr lang="en-US" smtClean="0"/>
+              <a:pPr/>
+              <a:t>4</a:t>
+            </a:fld>
+            <a:endParaRPr lang="en-US" dirty="0"/>
           </a:p>
         </p:txBody>
       </p:sp>
@@ -8131,6 +8881,25 @@
   <p:clrMapOvr>
     <a:masterClrMapping/>
   </p:clrMapOvr>
+  <mc:AlternateContent xmlns:mc="http://schemas.openxmlformats.org/markup-compatibility/2006">
+    <mc:Choice xmlns:p14="http://schemas.microsoft.com/office/powerpoint/2010/main" Requires="p14">
+      <p:transition spd="med" p14:dur="700">
+        <p:fade/>
+      </p:transition>
+    </mc:Choice>
+    <mc:Fallback>
+      <p:transition spd="med">
+        <p:fade/>
+      </p:transition>
+    </mc:Fallback>
+  </mc:AlternateContent>
+  <p:timing>
+    <p:tnLst>
+      <p:par>
+        <p:cTn id="1" dur="indefinite" restart="never" nodeType="tmRoot"/>
+      </p:par>
+    </p:tnLst>
+  </p:timing>
 </p:sld>
 </file>
 
@@ -8156,7 +8925,7 @@
           <p:cNvPr id="2" name="Titre 1">
             <a:extLst>
               <a:ext uri="{FF2B5EF4-FFF2-40B4-BE49-F238E27FC236}">
-                <a16:creationId xmlns:a16="http://schemas.microsoft.com/office/drawing/2014/main" id="{B1704B23-F8BC-4353-A45B-AC74C4D09F24}"/>
+                <a16:creationId xmlns:a16="http://schemas.microsoft.com/office/drawing/2014/main" xmlns="" id="{B1704B23-F8BC-4353-A45B-AC74C4D09F24}"/>
               </a:ext>
             </a:extLst>
           </p:cNvPr>
@@ -8184,7 +8953,7 @@
           <p:cNvPr id="3" name="Espace réservé du contenu 2">
             <a:extLst>
               <a:ext uri="{FF2B5EF4-FFF2-40B4-BE49-F238E27FC236}">
-                <a16:creationId xmlns:a16="http://schemas.microsoft.com/office/drawing/2014/main" id="{EE317497-43EA-45CC-B768-F6E39850A895}"/>
+                <a16:creationId xmlns:a16="http://schemas.microsoft.com/office/drawing/2014/main" xmlns="" id="{EE317497-43EA-45CC-B768-F6E39850A895}"/>
               </a:ext>
             </a:extLst>
           </p:cNvPr>
@@ -8239,6 +9008,70 @@
             </a:r>
           </a:p>
           <a:p>
+            <a:endParaRPr lang="en-US" dirty="0"/>
+          </a:p>
+        </p:txBody>
+      </p:sp>
+      <p:pic>
+        <p:nvPicPr>
+          <p:cNvPr id="4" name="Image 3"/>
+          <p:cNvPicPr>
+            <a:picLocks noChangeAspect="1"/>
+          </p:cNvPicPr>
+          <p:nvPr/>
+        </p:nvPicPr>
+        <p:blipFill>
+          <a:blip r:embed="rId2">
+            <a:extLst>
+              <a:ext uri="{28A0092B-C50C-407E-A947-70E740481C1C}">
+                <a14:useLocalDpi xmlns:a14="http://schemas.microsoft.com/office/drawing/2010/main" val="0"/>
+              </a:ext>
+            </a:extLst>
+          </a:blip>
+          <a:stretch>
+            <a:fillRect/>
+          </a:stretch>
+        </p:blipFill>
+        <p:spPr>
+          <a:xfrm>
+            <a:off x="285050" y="5713184"/>
+            <a:ext cx="1883304" cy="984178"/>
+          </a:xfrm>
+          <a:prstGeom prst="rect">
+            <a:avLst/>
+          </a:prstGeom>
+          <a:ln>
+            <a:noFill/>
+          </a:ln>
+          <a:effectLst>
+            <a:outerShdw blurRad="190500" algn="tl" rotWithShape="0">
+              <a:srgbClr val="000000">
+                <a:alpha val="70000"/>
+              </a:srgbClr>
+            </a:outerShdw>
+          </a:effectLst>
+        </p:spPr>
+      </p:pic>
+      <p:sp>
+        <p:nvSpPr>
+          <p:cNvPr id="5" name="Espace réservé du numéro de diapositive 4"/>
+          <p:cNvSpPr>
+            <a:spLocks noGrp="1"/>
+          </p:cNvSpPr>
+          <p:nvPr>
+            <p:ph type="sldNum" sz="quarter" idx="12"/>
+          </p:nvPr>
+        </p:nvSpPr>
+        <p:spPr/>
+        <p:txBody>
+          <a:bodyPr/>
+          <a:lstStyle/>
+          <a:p>
+            <a:fld id="{D57F1E4F-1CFF-5643-939E-217C01CDF565}" type="slidenum">
+              <a:rPr lang="en-US" smtClean="0"/>
+              <a:pPr/>
+              <a:t>5</a:t>
+            </a:fld>
             <a:endParaRPr lang="en-US" dirty="0"/>
           </a:p>
         </p:txBody>
@@ -8253,6 +9086,25 @@
   <p:clrMapOvr>
     <a:masterClrMapping/>
   </p:clrMapOvr>
+  <mc:AlternateContent xmlns:mc="http://schemas.openxmlformats.org/markup-compatibility/2006">
+    <mc:Choice xmlns:p14="http://schemas.microsoft.com/office/powerpoint/2010/main" Requires="p14">
+      <p:transition spd="med" p14:dur="700">
+        <p:fade/>
+      </p:transition>
+    </mc:Choice>
+    <mc:Fallback>
+      <p:transition spd="med">
+        <p:fade/>
+      </p:transition>
+    </mc:Fallback>
+  </mc:AlternateContent>
+  <p:timing>
+    <p:tnLst>
+      <p:par>
+        <p:cTn id="1" dur="indefinite" restart="never" nodeType="tmRoot"/>
+      </p:par>
+    </p:tnLst>
+  </p:timing>
 </p:sld>
 </file>
 
@@ -8278,7 +9130,7 @@
           <p:cNvPr id="2" name="Titre 1">
             <a:extLst>
               <a:ext uri="{FF2B5EF4-FFF2-40B4-BE49-F238E27FC236}">
-                <a16:creationId xmlns:a16="http://schemas.microsoft.com/office/drawing/2014/main" id="{E748F9FD-8DE7-4AEE-A623-17E882E8336E}"/>
+                <a16:creationId xmlns:a16="http://schemas.microsoft.com/office/drawing/2014/main" xmlns="" id="{E748F9FD-8DE7-4AEE-A623-17E882E8336E}"/>
               </a:ext>
             </a:extLst>
           </p:cNvPr>
@@ -8310,7 +9162,7 @@
           <p:cNvPr id="3" name="Espace réservé du contenu 2">
             <a:extLst>
               <a:ext uri="{FF2B5EF4-FFF2-40B4-BE49-F238E27FC236}">
-                <a16:creationId xmlns:a16="http://schemas.microsoft.com/office/drawing/2014/main" id="{1A3A47D0-588D-4B9F-86C5-3BF878A49184}"/>
+                <a16:creationId xmlns:a16="http://schemas.microsoft.com/office/drawing/2014/main" xmlns="" id="{1A3A47D0-588D-4B9F-86C5-3BF878A49184}"/>
               </a:ext>
             </a:extLst>
           </p:cNvPr>
@@ -8351,6 +9203,70 @@
               <a:rPr lang="en-US" dirty="0"/>
               <a:t>Model link the controller and the view</a:t>
             </a:r>
+          </a:p>
+        </p:txBody>
+      </p:sp>
+      <p:pic>
+        <p:nvPicPr>
+          <p:cNvPr id="4" name="Image 3"/>
+          <p:cNvPicPr>
+            <a:picLocks noChangeAspect="1"/>
+          </p:cNvPicPr>
+          <p:nvPr/>
+        </p:nvPicPr>
+        <p:blipFill>
+          <a:blip r:embed="rId2">
+            <a:extLst>
+              <a:ext uri="{28A0092B-C50C-407E-A947-70E740481C1C}">
+                <a14:useLocalDpi xmlns:a14="http://schemas.microsoft.com/office/drawing/2010/main" val="0"/>
+              </a:ext>
+            </a:extLst>
+          </a:blip>
+          <a:stretch>
+            <a:fillRect/>
+          </a:stretch>
+        </p:blipFill>
+        <p:spPr>
+          <a:xfrm>
+            <a:off x="285050" y="5713184"/>
+            <a:ext cx="1883304" cy="984178"/>
+          </a:xfrm>
+          <a:prstGeom prst="rect">
+            <a:avLst/>
+          </a:prstGeom>
+          <a:ln>
+            <a:noFill/>
+          </a:ln>
+          <a:effectLst>
+            <a:outerShdw blurRad="190500" algn="tl" rotWithShape="0">
+              <a:srgbClr val="000000">
+                <a:alpha val="70000"/>
+              </a:srgbClr>
+            </a:outerShdw>
+          </a:effectLst>
+        </p:spPr>
+      </p:pic>
+      <p:sp>
+        <p:nvSpPr>
+          <p:cNvPr id="5" name="Espace réservé du numéro de diapositive 4"/>
+          <p:cNvSpPr>
+            <a:spLocks noGrp="1"/>
+          </p:cNvSpPr>
+          <p:nvPr>
+            <p:ph type="sldNum" sz="quarter" idx="12"/>
+          </p:nvPr>
+        </p:nvSpPr>
+        <p:spPr/>
+        <p:txBody>
+          <a:bodyPr/>
+          <a:lstStyle/>
+          <a:p>
+            <a:fld id="{D57F1E4F-1CFF-5643-939E-217C01CDF565}" type="slidenum">
+              <a:rPr lang="en-US" smtClean="0"/>
+              <a:pPr/>
+              <a:t>6</a:t>
+            </a:fld>
+            <a:endParaRPr lang="en-US" dirty="0"/>
           </a:p>
         </p:txBody>
       </p:sp>
@@ -8364,6 +9280,25 @@
   <p:clrMapOvr>
     <a:masterClrMapping/>
   </p:clrMapOvr>
+  <mc:AlternateContent xmlns:mc="http://schemas.openxmlformats.org/markup-compatibility/2006">
+    <mc:Choice xmlns:p14="http://schemas.microsoft.com/office/powerpoint/2010/main" Requires="p14">
+      <p:transition spd="med" p14:dur="700">
+        <p:fade/>
+      </p:transition>
+    </mc:Choice>
+    <mc:Fallback>
+      <p:transition spd="med">
+        <p:fade/>
+      </p:transition>
+    </mc:Fallback>
+  </mc:AlternateContent>
+  <p:timing>
+    <p:tnLst>
+      <p:par>
+        <p:cTn id="1" dur="indefinite" restart="never" nodeType="tmRoot"/>
+      </p:par>
+    </p:tnLst>
+  </p:timing>
 </p:sld>
 </file>
 
@@ -8389,7 +9324,7 @@
           <p:cNvPr id="2" name="Titre 1">
             <a:extLst>
               <a:ext uri="{FF2B5EF4-FFF2-40B4-BE49-F238E27FC236}">
-                <a16:creationId xmlns:a16="http://schemas.microsoft.com/office/drawing/2014/main" id="{1E04A490-41A4-4228-965E-B0225D9446B7}"/>
+                <a16:creationId xmlns:a16="http://schemas.microsoft.com/office/drawing/2014/main" xmlns="" id="{1E04A490-41A4-4228-965E-B0225D9446B7}"/>
               </a:ext>
             </a:extLst>
           </p:cNvPr>
@@ -8417,7 +9352,7 @@
           <p:cNvPr id="3" name="Espace réservé du contenu 2">
             <a:extLst>
               <a:ext uri="{FF2B5EF4-FFF2-40B4-BE49-F238E27FC236}">
-                <a16:creationId xmlns:a16="http://schemas.microsoft.com/office/drawing/2014/main" id="{6C5C6164-A2F6-4867-89A7-C887C44B3A60}"/>
+                <a16:creationId xmlns:a16="http://schemas.microsoft.com/office/drawing/2014/main" xmlns="" id="{6C5C6164-A2F6-4867-89A7-C887C44B3A60}"/>
               </a:ext>
             </a:extLst>
           </p:cNvPr>
@@ -8434,6 +9369,70 @@
           <a:lstStyle/>
           <a:p>
             <a:endParaRPr lang="en-US"/>
+          </a:p>
+        </p:txBody>
+      </p:sp>
+      <p:pic>
+        <p:nvPicPr>
+          <p:cNvPr id="4" name="Image 3"/>
+          <p:cNvPicPr>
+            <a:picLocks noChangeAspect="1"/>
+          </p:cNvPicPr>
+          <p:nvPr/>
+        </p:nvPicPr>
+        <p:blipFill>
+          <a:blip r:embed="rId2">
+            <a:extLst>
+              <a:ext uri="{28A0092B-C50C-407E-A947-70E740481C1C}">
+                <a14:useLocalDpi xmlns:a14="http://schemas.microsoft.com/office/drawing/2010/main" val="0"/>
+              </a:ext>
+            </a:extLst>
+          </a:blip>
+          <a:stretch>
+            <a:fillRect/>
+          </a:stretch>
+        </p:blipFill>
+        <p:spPr>
+          <a:xfrm>
+            <a:off x="285050" y="5713184"/>
+            <a:ext cx="1883304" cy="984178"/>
+          </a:xfrm>
+          <a:prstGeom prst="rect">
+            <a:avLst/>
+          </a:prstGeom>
+          <a:ln>
+            <a:noFill/>
+          </a:ln>
+          <a:effectLst>
+            <a:outerShdw blurRad="190500" algn="tl" rotWithShape="0">
+              <a:srgbClr val="000000">
+                <a:alpha val="70000"/>
+              </a:srgbClr>
+            </a:outerShdw>
+          </a:effectLst>
+        </p:spPr>
+      </p:pic>
+      <p:sp>
+        <p:nvSpPr>
+          <p:cNvPr id="5" name="Espace réservé du numéro de diapositive 4"/>
+          <p:cNvSpPr>
+            <a:spLocks noGrp="1"/>
+          </p:cNvSpPr>
+          <p:nvPr>
+            <p:ph type="sldNum" sz="quarter" idx="12"/>
+          </p:nvPr>
+        </p:nvSpPr>
+        <p:spPr/>
+        <p:txBody>
+          <a:bodyPr/>
+          <a:lstStyle/>
+          <a:p>
+            <a:fld id="{D57F1E4F-1CFF-5643-939E-217C01CDF565}" type="slidenum">
+              <a:rPr lang="en-US" smtClean="0"/>
+              <a:pPr/>
+              <a:t>7</a:t>
+            </a:fld>
+            <a:endParaRPr lang="en-US" dirty="0"/>
           </a:p>
         </p:txBody>
       </p:sp>
@@ -8447,6 +9446,25 @@
   <p:clrMapOvr>
     <a:masterClrMapping/>
   </p:clrMapOvr>
+  <mc:AlternateContent xmlns:mc="http://schemas.openxmlformats.org/markup-compatibility/2006">
+    <mc:Choice xmlns:p14="http://schemas.microsoft.com/office/powerpoint/2010/main" Requires="p14">
+      <p:transition spd="med" p14:dur="700">
+        <p:fade/>
+      </p:transition>
+    </mc:Choice>
+    <mc:Fallback>
+      <p:transition spd="med">
+        <p:fade/>
+      </p:transition>
+    </mc:Fallback>
+  </mc:AlternateContent>
+  <p:timing>
+    <p:tnLst>
+      <p:par>
+        <p:cTn id="1" dur="indefinite" restart="never" nodeType="tmRoot"/>
+      </p:par>
+    </p:tnLst>
+  </p:timing>
 </p:sld>
 </file>
 
@@ -8472,7 +9490,7 @@
           <p:cNvPr id="2" name="Titre 1">
             <a:extLst>
               <a:ext uri="{FF2B5EF4-FFF2-40B4-BE49-F238E27FC236}">
-                <a16:creationId xmlns:a16="http://schemas.microsoft.com/office/drawing/2014/main" id="{ED04AC48-3D9E-4CF5-8775-B24A74F07015}"/>
+                <a16:creationId xmlns:a16="http://schemas.microsoft.com/office/drawing/2014/main" xmlns="" id="{ED04AC48-3D9E-4CF5-8775-B24A74F07015}"/>
               </a:ext>
             </a:extLst>
           </p:cNvPr>
@@ -8500,7 +9518,7 @@
           <p:cNvPr id="3" name="Espace réservé du contenu 2">
             <a:extLst>
               <a:ext uri="{FF2B5EF4-FFF2-40B4-BE49-F238E27FC236}">
-                <a16:creationId xmlns:a16="http://schemas.microsoft.com/office/drawing/2014/main" id="{66E9949E-5768-4752-A5FE-907A1DAEBAF5}"/>
+                <a16:creationId xmlns:a16="http://schemas.microsoft.com/office/drawing/2014/main" xmlns="" id="{66E9949E-5768-4752-A5FE-907A1DAEBAF5}"/>
               </a:ext>
             </a:extLst>
           </p:cNvPr>
@@ -8521,8 +9539,85 @@
           <a:p>
             <a:r>
               <a:rPr lang="en-US" dirty="0"/>
-              <a:t>Project at 80%</a:t>
-            </a:r>
+              <a:t>Project at 80</a:t>
+            </a:r>
+            <a:r>
+              <a:rPr lang="en-US" dirty="0" smtClean="0"/>
+              <a:t>%</a:t>
+            </a:r>
+          </a:p>
+          <a:p>
+            <a:r>
+              <a:rPr lang="en-US" dirty="0" smtClean="0"/>
+              <a:t>Architecture review</a:t>
+            </a:r>
+          </a:p>
+          <a:p>
+            <a:endParaRPr lang="en-US" dirty="0"/>
+          </a:p>
+        </p:txBody>
+      </p:sp>
+      <p:pic>
+        <p:nvPicPr>
+          <p:cNvPr id="4" name="Image 3"/>
+          <p:cNvPicPr>
+            <a:picLocks noChangeAspect="1"/>
+          </p:cNvPicPr>
+          <p:nvPr/>
+        </p:nvPicPr>
+        <p:blipFill>
+          <a:blip r:embed="rId2">
+            <a:extLst>
+              <a:ext uri="{28A0092B-C50C-407E-A947-70E740481C1C}">
+                <a14:useLocalDpi xmlns:a14="http://schemas.microsoft.com/office/drawing/2010/main" val="0"/>
+              </a:ext>
+            </a:extLst>
+          </a:blip>
+          <a:stretch>
+            <a:fillRect/>
+          </a:stretch>
+        </p:blipFill>
+        <p:spPr>
+          <a:xfrm>
+            <a:off x="285050" y="5713184"/>
+            <a:ext cx="1883304" cy="984178"/>
+          </a:xfrm>
+          <a:prstGeom prst="rect">
+            <a:avLst/>
+          </a:prstGeom>
+          <a:ln>
+            <a:noFill/>
+          </a:ln>
+          <a:effectLst>
+            <a:outerShdw blurRad="190500" algn="tl" rotWithShape="0">
+              <a:srgbClr val="000000">
+                <a:alpha val="70000"/>
+              </a:srgbClr>
+            </a:outerShdw>
+          </a:effectLst>
+        </p:spPr>
+      </p:pic>
+      <p:sp>
+        <p:nvSpPr>
+          <p:cNvPr id="5" name="Espace réservé du numéro de diapositive 4"/>
+          <p:cNvSpPr>
+            <a:spLocks noGrp="1"/>
+          </p:cNvSpPr>
+          <p:nvPr>
+            <p:ph type="sldNum" sz="quarter" idx="12"/>
+          </p:nvPr>
+        </p:nvSpPr>
+        <p:spPr/>
+        <p:txBody>
+          <a:bodyPr/>
+          <a:lstStyle/>
+          <a:p>
+            <a:fld id="{D57F1E4F-1CFF-5643-939E-217C01CDF565}" type="slidenum">
+              <a:rPr lang="en-US" smtClean="0"/>
+              <a:pPr/>
+              <a:t>8</a:t>
+            </a:fld>
+            <a:endParaRPr lang="en-US" dirty="0"/>
           </a:p>
         </p:txBody>
       </p:sp>
@@ -8536,6 +9631,25 @@
   <p:clrMapOvr>
     <a:masterClrMapping/>
   </p:clrMapOvr>
+  <mc:AlternateContent xmlns:mc="http://schemas.openxmlformats.org/markup-compatibility/2006">
+    <mc:Choice xmlns:p14="http://schemas.microsoft.com/office/powerpoint/2010/main" Requires="p14">
+      <p:transition spd="med" p14:dur="700">
+        <p:fade/>
+      </p:transition>
+    </mc:Choice>
+    <mc:Fallback>
+      <p:transition spd="med">
+        <p:fade/>
+      </p:transition>
+    </mc:Fallback>
+  </mc:AlternateContent>
+  <p:timing>
+    <p:tnLst>
+      <p:par>
+        <p:cTn id="1" dur="indefinite" restart="never" nodeType="tmRoot"/>
+      </p:par>
+    </p:tnLst>
+  </p:timing>
 </p:sld>
 </file>
 
@@ -8780,4 +9894,265 @@
     </a:ext>
   </a:extLst>
 </a:theme>
+</file>
+
+<file path=ppt/theme/theme2.xml><?xml version="1.0" encoding="utf-8"?>
+<a:theme xmlns:a="http://schemas.openxmlformats.org/drawingml/2006/main" name="Thème Office">
+  <a:themeElements>
+    <a:clrScheme name="Office">
+      <a:dk1>
+        <a:sysClr val="windowText" lastClr="000000"/>
+      </a:dk1>
+      <a:lt1>
+        <a:sysClr val="window" lastClr="FFFFFF"/>
+      </a:lt1>
+      <a:dk2>
+        <a:srgbClr val="44546A"/>
+      </a:dk2>
+      <a:lt2>
+        <a:srgbClr val="E7E6E6"/>
+      </a:lt2>
+      <a:accent1>
+        <a:srgbClr val="5B9BD5"/>
+      </a:accent1>
+      <a:accent2>
+        <a:srgbClr val="ED7D31"/>
+      </a:accent2>
+      <a:accent3>
+        <a:srgbClr val="A5A5A5"/>
+      </a:accent3>
+      <a:accent4>
+        <a:srgbClr val="FFC000"/>
+      </a:accent4>
+      <a:accent5>
+        <a:srgbClr val="4472C4"/>
+      </a:accent5>
+      <a:accent6>
+        <a:srgbClr val="70AD47"/>
+      </a:accent6>
+      <a:hlink>
+        <a:srgbClr val="0563C1"/>
+      </a:hlink>
+      <a:folHlink>
+        <a:srgbClr val="954F72"/>
+      </a:folHlink>
+    </a:clrScheme>
+    <a:fontScheme name="Office">
+      <a:majorFont>
+        <a:latin typeface="Calibri Light" panose="020F0302020204030204"/>
+        <a:ea typeface=""/>
+        <a:cs typeface=""/>
+        <a:font script="Jpan" typeface="ＭＳ Ｐゴシック"/>
+        <a:font script="Hang" typeface="맑은 고딕"/>
+        <a:font script="Hans" typeface="宋体"/>
+        <a:font script="Hant" typeface="新細明體"/>
+        <a:font script="Arab" typeface="Times New Roman"/>
+        <a:font script="Hebr" typeface="Times New Roman"/>
+        <a:font script="Thai" typeface="Angsana New"/>
+        <a:font script="Ethi" typeface="Nyala"/>
+        <a:font script="Beng" typeface="Vrinda"/>
+        <a:font script="Gujr" typeface="Shruti"/>
+        <a:font script="Khmr" typeface="MoolBoran"/>
+        <a:font script="Knda" typeface="Tunga"/>
+        <a:font script="Guru" typeface="Raavi"/>
+        <a:font script="Cans" typeface="Euphemia"/>
+        <a:font script="Cher" typeface="Plantagenet Cherokee"/>
+        <a:font script="Yiii" typeface="Microsoft Yi Baiti"/>
+        <a:font script="Tibt" typeface="Microsoft Himalaya"/>
+        <a:font script="Thaa" typeface="MV Boli"/>
+        <a:font script="Deva" typeface="Mangal"/>
+        <a:font script="Telu" typeface="Gautami"/>
+        <a:font script="Taml" typeface="Latha"/>
+        <a:font script="Syrc" typeface="Estrangelo Edessa"/>
+        <a:font script="Orya" typeface="Kalinga"/>
+        <a:font script="Mlym" typeface="Kartika"/>
+        <a:font script="Laoo" typeface="DokChampa"/>
+        <a:font script="Sinh" typeface="Iskoola Pota"/>
+        <a:font script="Mong" typeface="Mongolian Baiti"/>
+        <a:font script="Viet" typeface="Times New Roman"/>
+        <a:font script="Uigh" typeface="Microsoft Uighur"/>
+        <a:font script="Geor" typeface="Sylfaen"/>
+      </a:majorFont>
+      <a:minorFont>
+        <a:latin typeface="Calibri" panose="020F0502020204030204"/>
+        <a:ea typeface=""/>
+        <a:cs typeface=""/>
+        <a:font script="Jpan" typeface="ＭＳ Ｐゴシック"/>
+        <a:font script="Hang" typeface="맑은 고딕"/>
+        <a:font script="Hans" typeface="宋体"/>
+        <a:font script="Hant" typeface="新細明體"/>
+        <a:font script="Arab" typeface="Arial"/>
+        <a:font script="Hebr" typeface="Arial"/>
+        <a:font script="Thai" typeface="Cordia New"/>
+        <a:font script="Ethi" typeface="Nyala"/>
+        <a:font script="Beng" typeface="Vrinda"/>
+        <a:font script="Gujr" typeface="Shruti"/>
+        <a:font script="Khmr" typeface="DaunPenh"/>
+        <a:font script="Knda" typeface="Tunga"/>
+        <a:font script="Guru" typeface="Raavi"/>
+        <a:font script="Cans" typeface="Euphemia"/>
+        <a:font script="Cher" typeface="Plantagenet Cherokee"/>
+        <a:font script="Yiii" typeface="Microsoft Yi Baiti"/>
+        <a:font script="Tibt" typeface="Microsoft Himalaya"/>
+        <a:font script="Thaa" typeface="MV Boli"/>
+        <a:font script="Deva" typeface="Mangal"/>
+        <a:font script="Telu" typeface="Gautami"/>
+        <a:font script="Taml" typeface="Latha"/>
+        <a:font script="Syrc" typeface="Estrangelo Edessa"/>
+        <a:font script="Orya" typeface="Kalinga"/>
+        <a:font script="Mlym" typeface="Kartika"/>
+        <a:font script="Laoo" typeface="DokChampa"/>
+        <a:font script="Sinh" typeface="Iskoola Pota"/>
+        <a:font script="Mong" typeface="Mongolian Baiti"/>
+        <a:font script="Viet" typeface="Arial"/>
+        <a:font script="Uigh" typeface="Microsoft Uighur"/>
+        <a:font script="Geor" typeface="Sylfaen"/>
+      </a:minorFont>
+    </a:fontScheme>
+    <a:fmtScheme name="Office">
+      <a:fillStyleLst>
+        <a:solidFill>
+          <a:schemeClr val="phClr"/>
+        </a:solidFill>
+        <a:gradFill rotWithShape="1">
+          <a:gsLst>
+            <a:gs pos="0">
+              <a:schemeClr val="phClr">
+                <a:lumMod val="110000"/>
+                <a:satMod val="105000"/>
+                <a:tint val="67000"/>
+              </a:schemeClr>
+            </a:gs>
+            <a:gs pos="50000">
+              <a:schemeClr val="phClr">
+                <a:lumMod val="105000"/>
+                <a:satMod val="103000"/>
+                <a:tint val="73000"/>
+              </a:schemeClr>
+            </a:gs>
+            <a:gs pos="100000">
+              <a:schemeClr val="phClr">
+                <a:lumMod val="105000"/>
+                <a:satMod val="109000"/>
+                <a:tint val="81000"/>
+              </a:schemeClr>
+            </a:gs>
+          </a:gsLst>
+          <a:lin ang="5400000" scaled="0"/>
+        </a:gradFill>
+        <a:gradFill rotWithShape="1">
+          <a:gsLst>
+            <a:gs pos="0">
+              <a:schemeClr val="phClr">
+                <a:satMod val="103000"/>
+                <a:lumMod val="102000"/>
+                <a:tint val="94000"/>
+              </a:schemeClr>
+            </a:gs>
+            <a:gs pos="50000">
+              <a:schemeClr val="phClr">
+                <a:satMod val="110000"/>
+                <a:lumMod val="100000"/>
+                <a:shade val="100000"/>
+              </a:schemeClr>
+            </a:gs>
+            <a:gs pos="100000">
+              <a:schemeClr val="phClr">
+                <a:lumMod val="99000"/>
+                <a:satMod val="120000"/>
+                <a:shade val="78000"/>
+              </a:schemeClr>
+            </a:gs>
+          </a:gsLst>
+          <a:lin ang="5400000" scaled="0"/>
+        </a:gradFill>
+      </a:fillStyleLst>
+      <a:lnStyleLst>
+        <a:ln w="6350" cap="flat" cmpd="sng" algn="ctr">
+          <a:solidFill>
+            <a:schemeClr val="phClr"/>
+          </a:solidFill>
+          <a:prstDash val="solid"/>
+          <a:miter lim="800000"/>
+        </a:ln>
+        <a:ln w="12700" cap="flat" cmpd="sng" algn="ctr">
+          <a:solidFill>
+            <a:schemeClr val="phClr"/>
+          </a:solidFill>
+          <a:prstDash val="solid"/>
+          <a:miter lim="800000"/>
+        </a:ln>
+        <a:ln w="19050" cap="flat" cmpd="sng" algn="ctr">
+          <a:solidFill>
+            <a:schemeClr val="phClr"/>
+          </a:solidFill>
+          <a:prstDash val="solid"/>
+          <a:miter lim="800000"/>
+        </a:ln>
+      </a:lnStyleLst>
+      <a:effectStyleLst>
+        <a:effectStyle>
+          <a:effectLst/>
+        </a:effectStyle>
+        <a:effectStyle>
+          <a:effectLst/>
+        </a:effectStyle>
+        <a:effectStyle>
+          <a:effectLst>
+            <a:outerShdw blurRad="57150" dist="19050" dir="5400000" algn="ctr" rotWithShape="0">
+              <a:srgbClr val="000000">
+                <a:alpha val="63000"/>
+              </a:srgbClr>
+            </a:outerShdw>
+          </a:effectLst>
+        </a:effectStyle>
+      </a:effectStyleLst>
+      <a:bgFillStyleLst>
+        <a:solidFill>
+          <a:schemeClr val="phClr"/>
+        </a:solidFill>
+        <a:solidFill>
+          <a:schemeClr val="phClr">
+            <a:tint val="95000"/>
+            <a:satMod val="170000"/>
+          </a:schemeClr>
+        </a:solidFill>
+        <a:gradFill rotWithShape="1">
+          <a:gsLst>
+            <a:gs pos="0">
+              <a:schemeClr val="phClr">
+                <a:tint val="93000"/>
+                <a:satMod val="150000"/>
+                <a:shade val="98000"/>
+                <a:lumMod val="102000"/>
+              </a:schemeClr>
+            </a:gs>
+            <a:gs pos="50000">
+              <a:schemeClr val="phClr">
+                <a:tint val="98000"/>
+                <a:satMod val="130000"/>
+                <a:shade val="90000"/>
+                <a:lumMod val="103000"/>
+              </a:schemeClr>
+            </a:gs>
+            <a:gs pos="100000">
+              <a:schemeClr val="phClr">
+                <a:shade val="63000"/>
+                <a:satMod val="120000"/>
+              </a:schemeClr>
+            </a:gs>
+          </a:gsLst>
+          <a:lin ang="5400000" scaled="0"/>
+        </a:gradFill>
+      </a:bgFillStyleLst>
+    </a:fmtScheme>
+  </a:themeElements>
+  <a:objectDefaults/>
+  <a:extraClrSchemeLst/>
+  <a:extLst>
+    <a:ext uri="{05A4C25C-085E-4340-85A3-A5531E510DB2}">
+      <thm15:themeFamily xmlns:thm15="http://schemas.microsoft.com/office/thememl/2012/main" name="Office Theme" id="{62F939B6-93AF-4DB8-9C6B-D6C7DFDC589F}" vid="{4A3C46E8-61CC-4603-A589-7422A47A8E4A}"/>
+    </a:ext>
+  </a:extLst>
+</a:theme>
 </file>
</xml_diff>

<commit_message>
Boulder Dash Java Project v1.1.1
</commit_message>
<xml_diff>
--- a/Boulder Dash Java Project.pptx
+++ b/Boulder Dash Java Project.pptx
@@ -8077,7 +8077,7 @@
           <p:cNvPr id="2" name="Titre 1">
             <a:extLst>
               <a:ext uri="{FF2B5EF4-FFF2-40B4-BE49-F238E27FC236}">
-                <a16:creationId xmlns:a16="http://schemas.microsoft.com/office/drawing/2014/main" xmlns="" id="{A41FA085-563B-409C-ACF8-980AC7489436}"/>
+                <a16:creationId xmlns="" xmlns:a16="http://schemas.microsoft.com/office/drawing/2014/main" id="{A41FA085-563B-409C-ACF8-980AC7489436}"/>
               </a:ext>
             </a:extLst>
           </p:cNvPr>
@@ -8105,7 +8105,7 @@
           <p:cNvPr id="3" name="Sous-titre 2">
             <a:extLst>
               <a:ext uri="{FF2B5EF4-FFF2-40B4-BE49-F238E27FC236}">
-                <a16:creationId xmlns:a16="http://schemas.microsoft.com/office/drawing/2014/main" xmlns="" id="{DE100E32-2EE7-4AAE-9828-9AA8975D209C}"/>
+                <a16:creationId xmlns="" xmlns:a16="http://schemas.microsoft.com/office/drawing/2014/main" id="{DE100E32-2EE7-4AAE-9828-9AA8975D209C}"/>
               </a:ext>
             </a:extLst>
           </p:cNvPr>
@@ -8163,8 +8163,8 @@
         </p:blipFill>
         <p:spPr>
           <a:xfrm>
-            <a:off x="10170455" y="136168"/>
-            <a:ext cx="1883304" cy="984178"/>
+            <a:off x="9860691" y="136168"/>
+            <a:ext cx="2193067" cy="1146054"/>
           </a:xfrm>
           <a:prstGeom prst="rect">
             <a:avLst/>
@@ -8215,13 +8215,13 @@
   <p:clrMapOvr>
     <a:masterClrMapping/>
   </p:clrMapOvr>
-  <mc:AlternateContent xmlns:mc="http://schemas.openxmlformats.org/markup-compatibility/2006">
-    <mc:Choice xmlns:p14="http://schemas.microsoft.com/office/powerpoint/2010/main" Requires="p14">
+  <mc:AlternateContent xmlns:mc="http://schemas.openxmlformats.org/markup-compatibility/2006" xmlns:p14="http://schemas.microsoft.com/office/powerpoint/2010/main">
+    <mc:Choice Requires="p14">
       <p:transition spd="med" p14:dur="700">
         <p:fade/>
       </p:transition>
     </mc:Choice>
-    <mc:Fallback>
+    <mc:Fallback xmlns="">
       <p:transition spd="med">
         <p:fade/>
       </p:transition>
@@ -8259,7 +8259,7 @@
           <p:cNvPr id="2" name="Titre 1">
             <a:extLst>
               <a:ext uri="{FF2B5EF4-FFF2-40B4-BE49-F238E27FC236}">
-                <a16:creationId xmlns:a16="http://schemas.microsoft.com/office/drawing/2014/main" xmlns="" id="{AED4D63A-0491-4BBA-A260-30215E135C89}"/>
+                <a16:creationId xmlns="" xmlns:a16="http://schemas.microsoft.com/office/drawing/2014/main" id="{AED4D63A-0491-4BBA-A260-30215E135C89}"/>
               </a:ext>
             </a:extLst>
           </p:cNvPr>
@@ -8287,7 +8287,7 @@
           <p:cNvPr id="3" name="Espace réservé du contenu 2">
             <a:extLst>
               <a:ext uri="{FF2B5EF4-FFF2-40B4-BE49-F238E27FC236}">
-                <a16:creationId xmlns:a16="http://schemas.microsoft.com/office/drawing/2014/main" xmlns="" id="{6C3D1B59-A0D9-49E2-ACF6-E2E7B471D36D}"/>
+                <a16:creationId xmlns="" xmlns:a16="http://schemas.microsoft.com/office/drawing/2014/main" id="{6C3D1B59-A0D9-49E2-ACF6-E2E7B471D36D}"/>
               </a:ext>
             </a:extLst>
           </p:cNvPr>
@@ -8298,7 +8298,12 @@
             <p:ph idx="1"/>
           </p:nvPr>
         </p:nvSpPr>
-        <p:spPr/>
+        <p:spPr>
+          <a:xfrm>
+            <a:off x="2589212" y="2125362"/>
+            <a:ext cx="8915400" cy="3777622"/>
+          </a:xfrm>
+        </p:spPr>
         <p:txBody>
           <a:bodyPr>
             <a:normAutofit lnSpcReduction="10000"/>
@@ -8356,7 +8361,7 @@
           <p:cNvPr id="6" name="Image 5" descr="Une image contenant texte&#10;&#10;Description générée avec un niveau de confiance très élevé">
             <a:extLst>
               <a:ext uri="{FF2B5EF4-FFF2-40B4-BE49-F238E27FC236}">
-                <a16:creationId xmlns:a16="http://schemas.microsoft.com/office/drawing/2014/main" xmlns="" id="{7BC199B3-29C8-4EF1-8426-7EF96C165054}"/>
+                <a16:creationId xmlns="" xmlns:a16="http://schemas.microsoft.com/office/drawing/2014/main" id="{7BC199B3-29C8-4EF1-8426-7EF96C165054}"/>
               </a:ext>
             </a:extLst>
           </p:cNvPr>
@@ -8373,7 +8378,7 @@
         </p:blipFill>
         <p:spPr>
           <a:xfrm>
-            <a:off x="7046912" y="1099271"/>
+            <a:off x="6214888" y="1099271"/>
             <a:ext cx="3499601" cy="4811951"/>
           </a:xfrm>
           <a:prstGeom prst="rect">
@@ -8411,8 +8416,8 @@
         </p:blipFill>
         <p:spPr>
           <a:xfrm>
-            <a:off x="285050" y="5713184"/>
-            <a:ext cx="1883304" cy="984178"/>
+            <a:off x="10340187" y="5840626"/>
+            <a:ext cx="1639432" cy="856735"/>
           </a:xfrm>
           <a:prstGeom prst="rect">
             <a:avLst/>
@@ -8463,13 +8468,13 @@
   <p:clrMapOvr>
     <a:masterClrMapping/>
   </p:clrMapOvr>
-  <mc:AlternateContent xmlns:mc="http://schemas.openxmlformats.org/markup-compatibility/2006">
-    <mc:Choice xmlns:p14="http://schemas.microsoft.com/office/powerpoint/2010/main" Requires="p14">
+  <mc:AlternateContent xmlns:mc="http://schemas.openxmlformats.org/markup-compatibility/2006" xmlns:p14="http://schemas.microsoft.com/office/powerpoint/2010/main">
+    <mc:Choice Requires="p14">
       <p:transition spd="med" p14:dur="700">
         <p:fade/>
       </p:transition>
     </mc:Choice>
-    <mc:Fallback>
+    <mc:Fallback xmlns="">
       <p:transition spd="med">
         <p:fade/>
       </p:transition>
@@ -8507,7 +8512,7 @@
           <p:cNvPr id="2" name="Titre 1">
             <a:extLst>
               <a:ext uri="{FF2B5EF4-FFF2-40B4-BE49-F238E27FC236}">
-                <a16:creationId xmlns:a16="http://schemas.microsoft.com/office/drawing/2014/main" xmlns="" id="{F9D4DC50-378B-428A-AAC3-61881E6BF9A8}"/>
+                <a16:creationId xmlns="" xmlns:a16="http://schemas.microsoft.com/office/drawing/2014/main" id="{F9D4DC50-378B-428A-AAC3-61881E6BF9A8}"/>
               </a:ext>
             </a:extLst>
           </p:cNvPr>
@@ -8535,7 +8540,7 @@
           <p:cNvPr id="3" name="Espace réservé du contenu 2">
             <a:extLst>
               <a:ext uri="{FF2B5EF4-FFF2-40B4-BE49-F238E27FC236}">
-                <a16:creationId xmlns:a16="http://schemas.microsoft.com/office/drawing/2014/main" xmlns="" id="{40FF578C-9D68-4770-9A5A-75F77565F414}"/>
+                <a16:creationId xmlns="" xmlns:a16="http://schemas.microsoft.com/office/drawing/2014/main" id="{40FF578C-9D68-4770-9A5A-75F77565F414}"/>
               </a:ext>
             </a:extLst>
           </p:cNvPr>
@@ -8588,9 +8593,33 @@
           </a:p>
         </p:txBody>
       </p:sp>
+      <p:sp>
+        <p:nvSpPr>
+          <p:cNvPr id="5" name="Espace réservé du numéro de diapositive 4"/>
+          <p:cNvSpPr>
+            <a:spLocks noGrp="1"/>
+          </p:cNvSpPr>
+          <p:nvPr>
+            <p:ph type="sldNum" sz="quarter" idx="12"/>
+          </p:nvPr>
+        </p:nvSpPr>
+        <p:spPr/>
+        <p:txBody>
+          <a:bodyPr/>
+          <a:lstStyle/>
+          <a:p>
+            <a:fld id="{D57F1E4F-1CFF-5643-939E-217C01CDF565}" type="slidenum">
+              <a:rPr lang="en-US" smtClean="0"/>
+              <a:pPr/>
+              <a:t>3</a:t>
+            </a:fld>
+            <a:endParaRPr lang="en-US" dirty="0"/>
+          </a:p>
+        </p:txBody>
+      </p:sp>
       <p:pic>
         <p:nvPicPr>
-          <p:cNvPr id="4" name="Image 3"/>
+          <p:cNvPr id="6" name="Image 5"/>
           <p:cNvPicPr>
             <a:picLocks noChangeAspect="1"/>
           </p:cNvPicPr>
@@ -8610,8 +8639,8 @@
         </p:blipFill>
         <p:spPr>
           <a:xfrm>
-            <a:off x="285050" y="5713184"/>
-            <a:ext cx="1883304" cy="984178"/>
+            <a:off x="10340187" y="5840626"/>
+            <a:ext cx="1639432" cy="856735"/>
           </a:xfrm>
           <a:prstGeom prst="rect">
             <a:avLst/>
@@ -8628,30 +8657,6 @@
           </a:effectLst>
         </p:spPr>
       </p:pic>
-      <p:sp>
-        <p:nvSpPr>
-          <p:cNvPr id="5" name="Espace réservé du numéro de diapositive 4"/>
-          <p:cNvSpPr>
-            <a:spLocks noGrp="1"/>
-          </p:cNvSpPr>
-          <p:nvPr>
-            <p:ph type="sldNum" sz="quarter" idx="12"/>
-          </p:nvPr>
-        </p:nvSpPr>
-        <p:spPr/>
-        <p:txBody>
-          <a:bodyPr/>
-          <a:lstStyle/>
-          <a:p>
-            <a:fld id="{D57F1E4F-1CFF-5643-939E-217C01CDF565}" type="slidenum">
-              <a:rPr lang="en-US" smtClean="0"/>
-              <a:pPr/>
-              <a:t>3</a:t>
-            </a:fld>
-            <a:endParaRPr lang="en-US" dirty="0"/>
-          </a:p>
-        </p:txBody>
-      </p:sp>
     </p:spTree>
     <p:extLst>
       <p:ext uri="{BB962C8B-B14F-4D97-AF65-F5344CB8AC3E}">
@@ -8662,13 +8667,13 @@
   <p:clrMapOvr>
     <a:masterClrMapping/>
   </p:clrMapOvr>
-  <mc:AlternateContent xmlns:mc="http://schemas.openxmlformats.org/markup-compatibility/2006">
-    <mc:Choice xmlns:p14="http://schemas.microsoft.com/office/powerpoint/2010/main" Requires="p14">
+  <mc:AlternateContent xmlns:mc="http://schemas.openxmlformats.org/markup-compatibility/2006" xmlns:p14="http://schemas.microsoft.com/office/powerpoint/2010/main">
+    <mc:Choice Requires="p14">
       <p:transition spd="med" p14:dur="700">
         <p:fade/>
       </p:transition>
     </mc:Choice>
-    <mc:Fallback>
+    <mc:Fallback xmlns="">
       <p:transition spd="med">
         <p:fade/>
       </p:transition>
@@ -8706,7 +8711,7 @@
           <p:cNvPr id="2" name="Titre 1">
             <a:extLst>
               <a:ext uri="{FF2B5EF4-FFF2-40B4-BE49-F238E27FC236}">
-                <a16:creationId xmlns:a16="http://schemas.microsoft.com/office/drawing/2014/main" xmlns="" id="{80442A32-DAAA-4689-A4EC-0B45008BD46A}"/>
+                <a16:creationId xmlns="" xmlns:a16="http://schemas.microsoft.com/office/drawing/2014/main" id="{80442A32-DAAA-4689-A4EC-0B45008BD46A}"/>
               </a:ext>
             </a:extLst>
           </p:cNvPr>
@@ -8734,7 +8739,7 @@
           <p:cNvPr id="3" name="Espace réservé du contenu 2">
             <a:extLst>
               <a:ext uri="{FF2B5EF4-FFF2-40B4-BE49-F238E27FC236}">
-                <a16:creationId xmlns:a16="http://schemas.microsoft.com/office/drawing/2014/main" xmlns="" id="{0F89B193-AE89-461B-A710-2C5592FC61CB}"/>
+                <a16:creationId xmlns="" xmlns:a16="http://schemas.microsoft.com/office/drawing/2014/main" id="{0F89B193-AE89-461B-A710-2C5592FC61CB}"/>
               </a:ext>
             </a:extLst>
           </p:cNvPr>
@@ -8807,9 +8812,33 @@
           </a:p>
         </p:txBody>
       </p:sp>
+      <p:sp>
+        <p:nvSpPr>
+          <p:cNvPr id="5" name="Espace réservé du numéro de diapositive 4"/>
+          <p:cNvSpPr>
+            <a:spLocks noGrp="1"/>
+          </p:cNvSpPr>
+          <p:nvPr>
+            <p:ph type="sldNum" sz="quarter" idx="12"/>
+          </p:nvPr>
+        </p:nvSpPr>
+        <p:spPr/>
+        <p:txBody>
+          <a:bodyPr/>
+          <a:lstStyle/>
+          <a:p>
+            <a:fld id="{D57F1E4F-1CFF-5643-939E-217C01CDF565}" type="slidenum">
+              <a:rPr lang="en-US" smtClean="0"/>
+              <a:pPr/>
+              <a:t>4</a:t>
+            </a:fld>
+            <a:endParaRPr lang="en-US" dirty="0"/>
+          </a:p>
+        </p:txBody>
+      </p:sp>
       <p:pic>
         <p:nvPicPr>
-          <p:cNvPr id="4" name="Image 3"/>
+          <p:cNvPr id="6" name="Image 5"/>
           <p:cNvPicPr>
             <a:picLocks noChangeAspect="1"/>
           </p:cNvPicPr>
@@ -8829,8 +8858,8 @@
         </p:blipFill>
         <p:spPr>
           <a:xfrm>
-            <a:off x="285050" y="5713184"/>
-            <a:ext cx="1883304" cy="984178"/>
+            <a:off x="10340187" y="5840626"/>
+            <a:ext cx="1639432" cy="856735"/>
           </a:xfrm>
           <a:prstGeom prst="rect">
             <a:avLst/>
@@ -8847,30 +8876,6 @@
           </a:effectLst>
         </p:spPr>
       </p:pic>
-      <p:sp>
-        <p:nvSpPr>
-          <p:cNvPr id="5" name="Espace réservé du numéro de diapositive 4"/>
-          <p:cNvSpPr>
-            <a:spLocks noGrp="1"/>
-          </p:cNvSpPr>
-          <p:nvPr>
-            <p:ph type="sldNum" sz="quarter" idx="12"/>
-          </p:nvPr>
-        </p:nvSpPr>
-        <p:spPr/>
-        <p:txBody>
-          <a:bodyPr/>
-          <a:lstStyle/>
-          <a:p>
-            <a:fld id="{D57F1E4F-1CFF-5643-939E-217C01CDF565}" type="slidenum">
-              <a:rPr lang="en-US" smtClean="0"/>
-              <a:pPr/>
-              <a:t>4</a:t>
-            </a:fld>
-            <a:endParaRPr lang="en-US" dirty="0"/>
-          </a:p>
-        </p:txBody>
-      </p:sp>
     </p:spTree>
     <p:extLst>
       <p:ext uri="{BB962C8B-B14F-4D97-AF65-F5344CB8AC3E}">
@@ -8881,13 +8886,13 @@
   <p:clrMapOvr>
     <a:masterClrMapping/>
   </p:clrMapOvr>
-  <mc:AlternateContent xmlns:mc="http://schemas.openxmlformats.org/markup-compatibility/2006">
-    <mc:Choice xmlns:p14="http://schemas.microsoft.com/office/powerpoint/2010/main" Requires="p14">
+  <mc:AlternateContent xmlns:mc="http://schemas.openxmlformats.org/markup-compatibility/2006" xmlns:p14="http://schemas.microsoft.com/office/powerpoint/2010/main">
+    <mc:Choice Requires="p14">
       <p:transition spd="med" p14:dur="700">
         <p:fade/>
       </p:transition>
     </mc:Choice>
-    <mc:Fallback>
+    <mc:Fallback xmlns="">
       <p:transition spd="med">
         <p:fade/>
       </p:transition>
@@ -8925,7 +8930,7 @@
           <p:cNvPr id="2" name="Titre 1">
             <a:extLst>
               <a:ext uri="{FF2B5EF4-FFF2-40B4-BE49-F238E27FC236}">
-                <a16:creationId xmlns:a16="http://schemas.microsoft.com/office/drawing/2014/main" xmlns="" id="{B1704B23-F8BC-4353-A45B-AC74C4D09F24}"/>
+                <a16:creationId xmlns="" xmlns:a16="http://schemas.microsoft.com/office/drawing/2014/main" id="{B1704B23-F8BC-4353-A45B-AC74C4D09F24}"/>
               </a:ext>
             </a:extLst>
           </p:cNvPr>
@@ -8953,7 +8958,7 @@
           <p:cNvPr id="3" name="Espace réservé du contenu 2">
             <a:extLst>
               <a:ext uri="{FF2B5EF4-FFF2-40B4-BE49-F238E27FC236}">
-                <a16:creationId xmlns:a16="http://schemas.microsoft.com/office/drawing/2014/main" xmlns="" id="{EE317497-43EA-45CC-B768-F6E39850A895}"/>
+                <a16:creationId xmlns="" xmlns:a16="http://schemas.microsoft.com/office/drawing/2014/main" id="{EE317497-43EA-45CC-B768-F6E39850A895}"/>
               </a:ext>
             </a:extLst>
           </p:cNvPr>
@@ -9012,9 +9017,33 @@
           </a:p>
         </p:txBody>
       </p:sp>
+      <p:sp>
+        <p:nvSpPr>
+          <p:cNvPr id="5" name="Espace réservé du numéro de diapositive 4"/>
+          <p:cNvSpPr>
+            <a:spLocks noGrp="1"/>
+          </p:cNvSpPr>
+          <p:nvPr>
+            <p:ph type="sldNum" sz="quarter" idx="12"/>
+          </p:nvPr>
+        </p:nvSpPr>
+        <p:spPr/>
+        <p:txBody>
+          <a:bodyPr/>
+          <a:lstStyle/>
+          <a:p>
+            <a:fld id="{D57F1E4F-1CFF-5643-939E-217C01CDF565}" type="slidenum">
+              <a:rPr lang="en-US" smtClean="0"/>
+              <a:pPr/>
+              <a:t>5</a:t>
+            </a:fld>
+            <a:endParaRPr lang="en-US" dirty="0"/>
+          </a:p>
+        </p:txBody>
+      </p:sp>
       <p:pic>
         <p:nvPicPr>
-          <p:cNvPr id="4" name="Image 3"/>
+          <p:cNvPr id="6" name="Image 5"/>
           <p:cNvPicPr>
             <a:picLocks noChangeAspect="1"/>
           </p:cNvPicPr>
@@ -9034,8 +9063,8 @@
         </p:blipFill>
         <p:spPr>
           <a:xfrm>
-            <a:off x="285050" y="5713184"/>
-            <a:ext cx="1883304" cy="984178"/>
+            <a:off x="10340187" y="5840626"/>
+            <a:ext cx="1639432" cy="856735"/>
           </a:xfrm>
           <a:prstGeom prst="rect">
             <a:avLst/>
@@ -9052,30 +9081,6 @@
           </a:effectLst>
         </p:spPr>
       </p:pic>
-      <p:sp>
-        <p:nvSpPr>
-          <p:cNvPr id="5" name="Espace réservé du numéro de diapositive 4"/>
-          <p:cNvSpPr>
-            <a:spLocks noGrp="1"/>
-          </p:cNvSpPr>
-          <p:nvPr>
-            <p:ph type="sldNum" sz="quarter" idx="12"/>
-          </p:nvPr>
-        </p:nvSpPr>
-        <p:spPr/>
-        <p:txBody>
-          <a:bodyPr/>
-          <a:lstStyle/>
-          <a:p>
-            <a:fld id="{D57F1E4F-1CFF-5643-939E-217C01CDF565}" type="slidenum">
-              <a:rPr lang="en-US" smtClean="0"/>
-              <a:pPr/>
-              <a:t>5</a:t>
-            </a:fld>
-            <a:endParaRPr lang="en-US" dirty="0"/>
-          </a:p>
-        </p:txBody>
-      </p:sp>
     </p:spTree>
     <p:extLst>
       <p:ext uri="{BB962C8B-B14F-4D97-AF65-F5344CB8AC3E}">
@@ -9086,13 +9091,13 @@
   <p:clrMapOvr>
     <a:masterClrMapping/>
   </p:clrMapOvr>
-  <mc:AlternateContent xmlns:mc="http://schemas.openxmlformats.org/markup-compatibility/2006">
-    <mc:Choice xmlns:p14="http://schemas.microsoft.com/office/powerpoint/2010/main" Requires="p14">
+  <mc:AlternateContent xmlns:mc="http://schemas.openxmlformats.org/markup-compatibility/2006" xmlns:p14="http://schemas.microsoft.com/office/powerpoint/2010/main">
+    <mc:Choice Requires="p14">
       <p:transition spd="med" p14:dur="700">
         <p:fade/>
       </p:transition>
     </mc:Choice>
-    <mc:Fallback>
+    <mc:Fallback xmlns="">
       <p:transition spd="med">
         <p:fade/>
       </p:transition>
@@ -9130,7 +9135,7 @@
           <p:cNvPr id="2" name="Titre 1">
             <a:extLst>
               <a:ext uri="{FF2B5EF4-FFF2-40B4-BE49-F238E27FC236}">
-                <a16:creationId xmlns:a16="http://schemas.microsoft.com/office/drawing/2014/main" xmlns="" id="{E748F9FD-8DE7-4AEE-A623-17E882E8336E}"/>
+                <a16:creationId xmlns="" xmlns:a16="http://schemas.microsoft.com/office/drawing/2014/main" id="{E748F9FD-8DE7-4AEE-A623-17E882E8336E}"/>
               </a:ext>
             </a:extLst>
           </p:cNvPr>
@@ -9162,7 +9167,7 @@
           <p:cNvPr id="3" name="Espace réservé du contenu 2">
             <a:extLst>
               <a:ext uri="{FF2B5EF4-FFF2-40B4-BE49-F238E27FC236}">
-                <a16:creationId xmlns:a16="http://schemas.microsoft.com/office/drawing/2014/main" xmlns="" id="{1A3A47D0-588D-4B9F-86C5-3BF878A49184}"/>
+                <a16:creationId xmlns="" xmlns:a16="http://schemas.microsoft.com/office/drawing/2014/main" id="{1A3A47D0-588D-4B9F-86C5-3BF878A49184}"/>
               </a:ext>
             </a:extLst>
           </p:cNvPr>
@@ -9206,9 +9211,33 @@
           </a:p>
         </p:txBody>
       </p:sp>
+      <p:sp>
+        <p:nvSpPr>
+          <p:cNvPr id="5" name="Espace réservé du numéro de diapositive 4"/>
+          <p:cNvSpPr>
+            <a:spLocks noGrp="1"/>
+          </p:cNvSpPr>
+          <p:nvPr>
+            <p:ph type="sldNum" sz="quarter" idx="12"/>
+          </p:nvPr>
+        </p:nvSpPr>
+        <p:spPr/>
+        <p:txBody>
+          <a:bodyPr/>
+          <a:lstStyle/>
+          <a:p>
+            <a:fld id="{D57F1E4F-1CFF-5643-939E-217C01CDF565}" type="slidenum">
+              <a:rPr lang="en-US" smtClean="0"/>
+              <a:pPr/>
+              <a:t>6</a:t>
+            </a:fld>
+            <a:endParaRPr lang="en-US" dirty="0"/>
+          </a:p>
+        </p:txBody>
+      </p:sp>
       <p:pic>
         <p:nvPicPr>
-          <p:cNvPr id="4" name="Image 3"/>
+          <p:cNvPr id="6" name="Image 5"/>
           <p:cNvPicPr>
             <a:picLocks noChangeAspect="1"/>
           </p:cNvPicPr>
@@ -9228,8 +9257,8 @@
         </p:blipFill>
         <p:spPr>
           <a:xfrm>
-            <a:off x="285050" y="5713184"/>
-            <a:ext cx="1883304" cy="984178"/>
+            <a:off x="10340187" y="5840626"/>
+            <a:ext cx="1639432" cy="856735"/>
           </a:xfrm>
           <a:prstGeom prst="rect">
             <a:avLst/>
@@ -9246,30 +9275,6 @@
           </a:effectLst>
         </p:spPr>
       </p:pic>
-      <p:sp>
-        <p:nvSpPr>
-          <p:cNvPr id="5" name="Espace réservé du numéro de diapositive 4"/>
-          <p:cNvSpPr>
-            <a:spLocks noGrp="1"/>
-          </p:cNvSpPr>
-          <p:nvPr>
-            <p:ph type="sldNum" sz="quarter" idx="12"/>
-          </p:nvPr>
-        </p:nvSpPr>
-        <p:spPr/>
-        <p:txBody>
-          <a:bodyPr/>
-          <a:lstStyle/>
-          <a:p>
-            <a:fld id="{D57F1E4F-1CFF-5643-939E-217C01CDF565}" type="slidenum">
-              <a:rPr lang="en-US" smtClean="0"/>
-              <a:pPr/>
-              <a:t>6</a:t>
-            </a:fld>
-            <a:endParaRPr lang="en-US" dirty="0"/>
-          </a:p>
-        </p:txBody>
-      </p:sp>
     </p:spTree>
     <p:extLst>
       <p:ext uri="{BB962C8B-B14F-4D97-AF65-F5344CB8AC3E}">
@@ -9280,13 +9285,13 @@
   <p:clrMapOvr>
     <a:masterClrMapping/>
   </p:clrMapOvr>
-  <mc:AlternateContent xmlns:mc="http://schemas.openxmlformats.org/markup-compatibility/2006">
-    <mc:Choice xmlns:p14="http://schemas.microsoft.com/office/powerpoint/2010/main" Requires="p14">
+  <mc:AlternateContent xmlns:mc="http://schemas.openxmlformats.org/markup-compatibility/2006" xmlns:p14="http://schemas.microsoft.com/office/powerpoint/2010/main">
+    <mc:Choice Requires="p14">
       <p:transition spd="med" p14:dur="700">
         <p:fade/>
       </p:transition>
     </mc:Choice>
-    <mc:Fallback>
+    <mc:Fallback xmlns="">
       <p:transition spd="med">
         <p:fade/>
       </p:transition>
@@ -9324,7 +9329,7 @@
           <p:cNvPr id="2" name="Titre 1">
             <a:extLst>
               <a:ext uri="{FF2B5EF4-FFF2-40B4-BE49-F238E27FC236}">
-                <a16:creationId xmlns:a16="http://schemas.microsoft.com/office/drawing/2014/main" xmlns="" id="{1E04A490-41A4-4228-965E-B0225D9446B7}"/>
+                <a16:creationId xmlns="" xmlns:a16="http://schemas.microsoft.com/office/drawing/2014/main" id="{1E04A490-41A4-4228-965E-B0225D9446B7}"/>
               </a:ext>
             </a:extLst>
           </p:cNvPr>
@@ -9352,7 +9357,7 @@
           <p:cNvPr id="3" name="Espace réservé du contenu 2">
             <a:extLst>
               <a:ext uri="{FF2B5EF4-FFF2-40B4-BE49-F238E27FC236}">
-                <a16:creationId xmlns:a16="http://schemas.microsoft.com/office/drawing/2014/main" xmlns="" id="{6C5C6164-A2F6-4867-89A7-C887C44B3A60}"/>
+                <a16:creationId xmlns="" xmlns:a16="http://schemas.microsoft.com/office/drawing/2014/main" id="{6C5C6164-A2F6-4867-89A7-C887C44B3A60}"/>
               </a:ext>
             </a:extLst>
           </p:cNvPr>
@@ -9363,18 +9368,47 @@
             <p:ph idx="1"/>
           </p:nvPr>
         </p:nvSpPr>
-        <p:spPr/>
+        <p:spPr>
+          <a:xfrm>
+            <a:off x="2589212" y="2133600"/>
+            <a:ext cx="8915400" cy="3777622"/>
+          </a:xfrm>
+        </p:spPr>
         <p:txBody>
           <a:bodyPr/>
           <a:lstStyle/>
           <a:p>
-            <a:endParaRPr lang="en-US"/>
+            <a:endParaRPr lang="en-US" dirty="0"/>
+          </a:p>
+        </p:txBody>
+      </p:sp>
+      <p:sp>
+        <p:nvSpPr>
+          <p:cNvPr id="5" name="Espace réservé du numéro de diapositive 4"/>
+          <p:cNvSpPr>
+            <a:spLocks noGrp="1"/>
+          </p:cNvSpPr>
+          <p:nvPr>
+            <p:ph type="sldNum" sz="quarter" idx="12"/>
+          </p:nvPr>
+        </p:nvSpPr>
+        <p:spPr/>
+        <p:txBody>
+          <a:bodyPr/>
+          <a:lstStyle/>
+          <a:p>
+            <a:fld id="{D57F1E4F-1CFF-5643-939E-217C01CDF565}" type="slidenum">
+              <a:rPr lang="en-US" smtClean="0"/>
+              <a:pPr/>
+              <a:t>7</a:t>
+            </a:fld>
+            <a:endParaRPr lang="en-US" dirty="0"/>
           </a:p>
         </p:txBody>
       </p:sp>
       <p:pic>
         <p:nvPicPr>
-          <p:cNvPr id="4" name="Image 3"/>
+          <p:cNvPr id="6" name="Image 5"/>
           <p:cNvPicPr>
             <a:picLocks noChangeAspect="1"/>
           </p:cNvPicPr>
@@ -9394,8 +9428,8 @@
         </p:blipFill>
         <p:spPr>
           <a:xfrm>
-            <a:off x="285050" y="5713184"/>
-            <a:ext cx="1883304" cy="984178"/>
+            <a:off x="10340187" y="5840626"/>
+            <a:ext cx="1639432" cy="856735"/>
           </a:xfrm>
           <a:prstGeom prst="rect">
             <a:avLst/>
@@ -9412,30 +9446,6 @@
           </a:effectLst>
         </p:spPr>
       </p:pic>
-      <p:sp>
-        <p:nvSpPr>
-          <p:cNvPr id="5" name="Espace réservé du numéro de diapositive 4"/>
-          <p:cNvSpPr>
-            <a:spLocks noGrp="1"/>
-          </p:cNvSpPr>
-          <p:nvPr>
-            <p:ph type="sldNum" sz="quarter" idx="12"/>
-          </p:nvPr>
-        </p:nvSpPr>
-        <p:spPr/>
-        <p:txBody>
-          <a:bodyPr/>
-          <a:lstStyle/>
-          <a:p>
-            <a:fld id="{D57F1E4F-1CFF-5643-939E-217C01CDF565}" type="slidenum">
-              <a:rPr lang="en-US" smtClean="0"/>
-              <a:pPr/>
-              <a:t>7</a:t>
-            </a:fld>
-            <a:endParaRPr lang="en-US" dirty="0"/>
-          </a:p>
-        </p:txBody>
-      </p:sp>
     </p:spTree>
     <p:extLst>
       <p:ext uri="{BB962C8B-B14F-4D97-AF65-F5344CB8AC3E}">
@@ -9446,13 +9456,13 @@
   <p:clrMapOvr>
     <a:masterClrMapping/>
   </p:clrMapOvr>
-  <mc:AlternateContent xmlns:mc="http://schemas.openxmlformats.org/markup-compatibility/2006">
-    <mc:Choice xmlns:p14="http://schemas.microsoft.com/office/powerpoint/2010/main" Requires="p14">
+  <mc:AlternateContent xmlns:mc="http://schemas.openxmlformats.org/markup-compatibility/2006" xmlns:p14="http://schemas.microsoft.com/office/powerpoint/2010/main">
+    <mc:Choice Requires="p14">
       <p:transition spd="med" p14:dur="700">
         <p:fade/>
       </p:transition>
     </mc:Choice>
-    <mc:Fallback>
+    <mc:Fallback xmlns="">
       <p:transition spd="med">
         <p:fade/>
       </p:transition>
@@ -9490,7 +9500,7 @@
           <p:cNvPr id="2" name="Titre 1">
             <a:extLst>
               <a:ext uri="{FF2B5EF4-FFF2-40B4-BE49-F238E27FC236}">
-                <a16:creationId xmlns:a16="http://schemas.microsoft.com/office/drawing/2014/main" xmlns="" id="{ED04AC48-3D9E-4CF5-8775-B24A74F07015}"/>
+                <a16:creationId xmlns="" xmlns:a16="http://schemas.microsoft.com/office/drawing/2014/main" id="{ED04AC48-3D9E-4CF5-8775-B24A74F07015}"/>
               </a:ext>
             </a:extLst>
           </p:cNvPr>
@@ -9518,7 +9528,7 @@
           <p:cNvPr id="3" name="Espace réservé du contenu 2">
             <a:extLst>
               <a:ext uri="{FF2B5EF4-FFF2-40B4-BE49-F238E27FC236}">
-                <a16:creationId xmlns:a16="http://schemas.microsoft.com/office/drawing/2014/main" xmlns="" id="{66E9949E-5768-4752-A5FE-907A1DAEBAF5}"/>
+                <a16:creationId xmlns="" xmlns:a16="http://schemas.microsoft.com/office/drawing/2014/main" id="{66E9949E-5768-4752-A5FE-907A1DAEBAF5}"/>
               </a:ext>
             </a:extLst>
           </p:cNvPr>
@@ -9547,19 +9557,72 @@
             </a:r>
           </a:p>
           <a:p>
+            <a:pPr lvl="1"/>
             <a:r>
               <a:rPr lang="en-US" dirty="0" smtClean="0"/>
-              <a:t>Architecture review</a:t>
-            </a:r>
-          </a:p>
-          <a:p>
+              <a:t>Kill player</a:t>
+            </a:r>
+          </a:p>
+          <a:p>
+            <a:pPr lvl="1"/>
+            <a:r>
+              <a:rPr lang="en-US" dirty="0" smtClean="0"/>
+              <a:t>Kill enemy</a:t>
+            </a:r>
+          </a:p>
+          <a:p>
+            <a:pPr lvl="1"/>
+            <a:r>
+              <a:rPr lang="en-US" dirty="0" smtClean="0"/>
+              <a:t>Refresh the view</a:t>
+            </a:r>
+            <a:endParaRPr lang="en-US" dirty="0" smtClean="0"/>
+          </a:p>
+          <a:p>
+            <a:r>
+              <a:rPr lang="en-US" dirty="0" smtClean="0"/>
+              <a:t>Architecture </a:t>
+            </a:r>
+            <a:r>
+              <a:rPr lang="en-US" dirty="0" smtClean="0"/>
+              <a:t>review</a:t>
+            </a:r>
+          </a:p>
+          <a:p>
+            <a:endParaRPr lang="en-US" dirty="0" smtClean="0"/>
+          </a:p>
+          <a:p>
+            <a:endParaRPr lang="en-US" dirty="0"/>
+          </a:p>
+        </p:txBody>
+      </p:sp>
+      <p:sp>
+        <p:nvSpPr>
+          <p:cNvPr id="5" name="Espace réservé du numéro de diapositive 4"/>
+          <p:cNvSpPr>
+            <a:spLocks noGrp="1"/>
+          </p:cNvSpPr>
+          <p:nvPr>
+            <p:ph type="sldNum" sz="quarter" idx="12"/>
+          </p:nvPr>
+        </p:nvSpPr>
+        <p:spPr/>
+        <p:txBody>
+          <a:bodyPr/>
+          <a:lstStyle/>
+          <a:p>
+            <a:fld id="{D57F1E4F-1CFF-5643-939E-217C01CDF565}" type="slidenum">
+              <a:rPr lang="en-US" smtClean="0"/>
+              <a:pPr/>
+              <a:t>8</a:t>
+            </a:fld>
             <a:endParaRPr lang="en-US" dirty="0"/>
           </a:p>
         </p:txBody>
       </p:sp>
       <p:pic>
         <p:nvPicPr>
-          <p:cNvPr id="4" name="Image 3"/>
+          <p:cNvPr id="6" name="Image 5"/>
           <p:cNvPicPr>
             <a:picLocks noChangeAspect="1"/>
           </p:cNvPicPr>
@@ -9579,8 +9642,8 @@
         </p:blipFill>
         <p:spPr>
           <a:xfrm>
-            <a:off x="285050" y="5713184"/>
-            <a:ext cx="1883304" cy="984178"/>
+            <a:off x="10340187" y="5840626"/>
+            <a:ext cx="1639432" cy="856735"/>
           </a:xfrm>
           <a:prstGeom prst="rect">
             <a:avLst/>
@@ -9597,30 +9660,6 @@
           </a:effectLst>
         </p:spPr>
       </p:pic>
-      <p:sp>
-        <p:nvSpPr>
-          <p:cNvPr id="5" name="Espace réservé du numéro de diapositive 4"/>
-          <p:cNvSpPr>
-            <a:spLocks noGrp="1"/>
-          </p:cNvSpPr>
-          <p:nvPr>
-            <p:ph type="sldNum" sz="quarter" idx="12"/>
-          </p:nvPr>
-        </p:nvSpPr>
-        <p:spPr/>
-        <p:txBody>
-          <a:bodyPr/>
-          <a:lstStyle/>
-          <a:p>
-            <a:fld id="{D57F1E4F-1CFF-5643-939E-217C01CDF565}" type="slidenum">
-              <a:rPr lang="en-US" smtClean="0"/>
-              <a:pPr/>
-              <a:t>8</a:t>
-            </a:fld>
-            <a:endParaRPr lang="en-US" dirty="0"/>
-          </a:p>
-        </p:txBody>
-      </p:sp>
     </p:spTree>
     <p:extLst>
       <p:ext uri="{BB962C8B-B14F-4D97-AF65-F5344CB8AC3E}">
@@ -9631,13 +9670,13 @@
   <p:clrMapOvr>
     <a:masterClrMapping/>
   </p:clrMapOvr>
-  <mc:AlternateContent xmlns:mc="http://schemas.openxmlformats.org/markup-compatibility/2006">
-    <mc:Choice xmlns:p14="http://schemas.microsoft.com/office/powerpoint/2010/main" Requires="p14">
+  <mc:AlternateContent xmlns:mc="http://schemas.openxmlformats.org/markup-compatibility/2006" xmlns:p14="http://schemas.microsoft.com/office/powerpoint/2010/main">
+    <mc:Choice Requires="p14">
       <p:transition spd="med" p14:dur="700">
         <p:fade/>
       </p:transition>
     </mc:Choice>
-    <mc:Fallback>
+    <mc:Fallback xmlns="">
       <p:transition spd="med">
         <p:fade/>
       </p:transition>

</xml_diff>

<commit_message>
Boulder Dash Java Project v1.2
</commit_message>
<xml_diff>
--- a/Boulder Dash Java Project.pptx
+++ b/Boulder Dash Java Project.pptx
@@ -8077,7 +8077,7 @@
           <p:cNvPr id="2" name="Titre 1">
             <a:extLst>
               <a:ext uri="{FF2B5EF4-FFF2-40B4-BE49-F238E27FC236}">
-                <a16:creationId xmlns="" xmlns:a16="http://schemas.microsoft.com/office/drawing/2014/main" id="{A41FA085-563B-409C-ACF8-980AC7489436}"/>
+                <a16:creationId xmlns:a16="http://schemas.microsoft.com/office/drawing/2014/main" xmlns="" id="{A41FA085-563B-409C-ACF8-980AC7489436}"/>
               </a:ext>
             </a:extLst>
           </p:cNvPr>
@@ -8105,7 +8105,7 @@
           <p:cNvPr id="3" name="Sous-titre 2">
             <a:extLst>
               <a:ext uri="{FF2B5EF4-FFF2-40B4-BE49-F238E27FC236}">
-                <a16:creationId xmlns="" xmlns:a16="http://schemas.microsoft.com/office/drawing/2014/main" id="{DE100E32-2EE7-4AAE-9828-9AA8975D209C}"/>
+                <a16:creationId xmlns:a16="http://schemas.microsoft.com/office/drawing/2014/main" xmlns="" id="{DE100E32-2EE7-4AAE-9828-9AA8975D209C}"/>
               </a:ext>
             </a:extLst>
           </p:cNvPr>
@@ -8259,7 +8259,7 @@
           <p:cNvPr id="2" name="Titre 1">
             <a:extLst>
               <a:ext uri="{FF2B5EF4-FFF2-40B4-BE49-F238E27FC236}">
-                <a16:creationId xmlns="" xmlns:a16="http://schemas.microsoft.com/office/drawing/2014/main" id="{AED4D63A-0491-4BBA-A260-30215E135C89}"/>
+                <a16:creationId xmlns:a16="http://schemas.microsoft.com/office/drawing/2014/main" xmlns="" id="{AED4D63A-0491-4BBA-A260-30215E135C89}"/>
               </a:ext>
             </a:extLst>
           </p:cNvPr>
@@ -8287,7 +8287,7 @@
           <p:cNvPr id="3" name="Espace réservé du contenu 2">
             <a:extLst>
               <a:ext uri="{FF2B5EF4-FFF2-40B4-BE49-F238E27FC236}">
-                <a16:creationId xmlns="" xmlns:a16="http://schemas.microsoft.com/office/drawing/2014/main" id="{6C3D1B59-A0D9-49E2-ACF6-E2E7B471D36D}"/>
+                <a16:creationId xmlns:a16="http://schemas.microsoft.com/office/drawing/2014/main" xmlns="" id="{6C3D1B59-A0D9-49E2-ACF6-E2E7B471D36D}"/>
               </a:ext>
             </a:extLst>
           </p:cNvPr>
@@ -8361,7 +8361,7 @@
           <p:cNvPr id="6" name="Image 5" descr="Une image contenant texte&#10;&#10;Description générée avec un niveau de confiance très élevé">
             <a:extLst>
               <a:ext uri="{FF2B5EF4-FFF2-40B4-BE49-F238E27FC236}">
-                <a16:creationId xmlns="" xmlns:a16="http://schemas.microsoft.com/office/drawing/2014/main" id="{7BC199B3-29C8-4EF1-8426-7EF96C165054}"/>
+                <a16:creationId xmlns:a16="http://schemas.microsoft.com/office/drawing/2014/main" xmlns="" id="{7BC199B3-29C8-4EF1-8426-7EF96C165054}"/>
               </a:ext>
             </a:extLst>
           </p:cNvPr>
@@ -8512,7 +8512,7 @@
           <p:cNvPr id="2" name="Titre 1">
             <a:extLst>
               <a:ext uri="{FF2B5EF4-FFF2-40B4-BE49-F238E27FC236}">
-                <a16:creationId xmlns="" xmlns:a16="http://schemas.microsoft.com/office/drawing/2014/main" id="{F9D4DC50-378B-428A-AAC3-61881E6BF9A8}"/>
+                <a16:creationId xmlns:a16="http://schemas.microsoft.com/office/drawing/2014/main" xmlns="" id="{F9D4DC50-378B-428A-AAC3-61881E6BF9A8}"/>
               </a:ext>
             </a:extLst>
           </p:cNvPr>
@@ -8540,7 +8540,7 @@
           <p:cNvPr id="3" name="Espace réservé du contenu 2">
             <a:extLst>
               <a:ext uri="{FF2B5EF4-FFF2-40B4-BE49-F238E27FC236}">
-                <a16:creationId xmlns="" xmlns:a16="http://schemas.microsoft.com/office/drawing/2014/main" id="{40FF578C-9D68-4770-9A5A-75F77565F414}"/>
+                <a16:creationId xmlns:a16="http://schemas.microsoft.com/office/drawing/2014/main" xmlns="" id="{40FF578C-9D68-4770-9A5A-75F77565F414}"/>
               </a:ext>
             </a:extLst>
           </p:cNvPr>
@@ -8711,7 +8711,7 @@
           <p:cNvPr id="2" name="Titre 1">
             <a:extLst>
               <a:ext uri="{FF2B5EF4-FFF2-40B4-BE49-F238E27FC236}">
-                <a16:creationId xmlns="" xmlns:a16="http://schemas.microsoft.com/office/drawing/2014/main" id="{80442A32-DAAA-4689-A4EC-0B45008BD46A}"/>
+                <a16:creationId xmlns:a16="http://schemas.microsoft.com/office/drawing/2014/main" xmlns="" id="{80442A32-DAAA-4689-A4EC-0B45008BD46A}"/>
               </a:ext>
             </a:extLst>
           </p:cNvPr>
@@ -8739,7 +8739,7 @@
           <p:cNvPr id="3" name="Espace réservé du contenu 2">
             <a:extLst>
               <a:ext uri="{FF2B5EF4-FFF2-40B4-BE49-F238E27FC236}">
-                <a16:creationId xmlns="" xmlns:a16="http://schemas.microsoft.com/office/drawing/2014/main" id="{0F89B193-AE89-461B-A710-2C5592FC61CB}"/>
+                <a16:creationId xmlns:a16="http://schemas.microsoft.com/office/drawing/2014/main" xmlns="" id="{0F89B193-AE89-461B-A710-2C5592FC61CB}"/>
               </a:ext>
             </a:extLst>
           </p:cNvPr>
@@ -8930,7 +8930,7 @@
           <p:cNvPr id="2" name="Titre 1">
             <a:extLst>
               <a:ext uri="{FF2B5EF4-FFF2-40B4-BE49-F238E27FC236}">
-                <a16:creationId xmlns="" xmlns:a16="http://schemas.microsoft.com/office/drawing/2014/main" id="{B1704B23-F8BC-4353-A45B-AC74C4D09F24}"/>
+                <a16:creationId xmlns:a16="http://schemas.microsoft.com/office/drawing/2014/main" xmlns="" id="{B1704B23-F8BC-4353-A45B-AC74C4D09F24}"/>
               </a:ext>
             </a:extLst>
           </p:cNvPr>
@@ -8958,7 +8958,7 @@
           <p:cNvPr id="3" name="Espace réservé du contenu 2">
             <a:extLst>
               <a:ext uri="{FF2B5EF4-FFF2-40B4-BE49-F238E27FC236}">
-                <a16:creationId xmlns="" xmlns:a16="http://schemas.microsoft.com/office/drawing/2014/main" id="{EE317497-43EA-45CC-B768-F6E39850A895}"/>
+                <a16:creationId xmlns:a16="http://schemas.microsoft.com/office/drawing/2014/main" xmlns="" id="{EE317497-43EA-45CC-B768-F6E39850A895}"/>
               </a:ext>
             </a:extLst>
           </p:cNvPr>
@@ -9135,7 +9135,7 @@
           <p:cNvPr id="2" name="Titre 1">
             <a:extLst>
               <a:ext uri="{FF2B5EF4-FFF2-40B4-BE49-F238E27FC236}">
-                <a16:creationId xmlns="" xmlns:a16="http://schemas.microsoft.com/office/drawing/2014/main" id="{E748F9FD-8DE7-4AEE-A623-17E882E8336E}"/>
+                <a16:creationId xmlns:a16="http://schemas.microsoft.com/office/drawing/2014/main" xmlns="" id="{E748F9FD-8DE7-4AEE-A623-17E882E8336E}"/>
               </a:ext>
             </a:extLst>
           </p:cNvPr>
@@ -9167,7 +9167,7 @@
           <p:cNvPr id="3" name="Espace réservé du contenu 2">
             <a:extLst>
               <a:ext uri="{FF2B5EF4-FFF2-40B4-BE49-F238E27FC236}">
-                <a16:creationId xmlns="" xmlns:a16="http://schemas.microsoft.com/office/drawing/2014/main" id="{1A3A47D0-588D-4B9F-86C5-3BF878A49184}"/>
+                <a16:creationId xmlns:a16="http://schemas.microsoft.com/office/drawing/2014/main" xmlns="" id="{1A3A47D0-588D-4B9F-86C5-3BF878A49184}"/>
               </a:ext>
             </a:extLst>
           </p:cNvPr>
@@ -9329,7 +9329,7 @@
           <p:cNvPr id="2" name="Titre 1">
             <a:extLst>
               <a:ext uri="{FF2B5EF4-FFF2-40B4-BE49-F238E27FC236}">
-                <a16:creationId xmlns="" xmlns:a16="http://schemas.microsoft.com/office/drawing/2014/main" id="{1E04A490-41A4-4228-965E-B0225D9446B7}"/>
+                <a16:creationId xmlns:a16="http://schemas.microsoft.com/office/drawing/2014/main" xmlns="" id="{1E04A490-41A4-4228-965E-B0225D9446B7}"/>
               </a:ext>
             </a:extLst>
           </p:cNvPr>
@@ -9357,7 +9357,7 @@
           <p:cNvPr id="3" name="Espace réservé du contenu 2">
             <a:extLst>
               <a:ext uri="{FF2B5EF4-FFF2-40B4-BE49-F238E27FC236}">
-                <a16:creationId xmlns="" xmlns:a16="http://schemas.microsoft.com/office/drawing/2014/main" id="{6C5C6164-A2F6-4867-89A7-C887C44B3A60}"/>
+                <a16:creationId xmlns:a16="http://schemas.microsoft.com/office/drawing/2014/main" xmlns="" id="{6C5C6164-A2F6-4867-89A7-C887C44B3A60}"/>
               </a:ext>
             </a:extLst>
           </p:cNvPr>
@@ -9500,7 +9500,7 @@
           <p:cNvPr id="2" name="Titre 1">
             <a:extLst>
               <a:ext uri="{FF2B5EF4-FFF2-40B4-BE49-F238E27FC236}">
-                <a16:creationId xmlns="" xmlns:a16="http://schemas.microsoft.com/office/drawing/2014/main" id="{ED04AC48-3D9E-4CF5-8775-B24A74F07015}"/>
+                <a16:creationId xmlns:a16="http://schemas.microsoft.com/office/drawing/2014/main" xmlns="" id="{ED04AC48-3D9E-4CF5-8775-B24A74F07015}"/>
               </a:ext>
             </a:extLst>
           </p:cNvPr>
@@ -9528,7 +9528,7 @@
           <p:cNvPr id="3" name="Espace réservé du contenu 2">
             <a:extLst>
               <a:ext uri="{FF2B5EF4-FFF2-40B4-BE49-F238E27FC236}">
-                <a16:creationId xmlns="" xmlns:a16="http://schemas.microsoft.com/office/drawing/2014/main" id="{66E9949E-5768-4752-A5FE-907A1DAEBAF5}"/>
+                <a16:creationId xmlns:a16="http://schemas.microsoft.com/office/drawing/2014/main" xmlns="" id="{66E9949E-5768-4752-A5FE-907A1DAEBAF5}"/>
               </a:ext>
             </a:extLst>
           </p:cNvPr>
@@ -9576,16 +9576,11 @@
               <a:rPr lang="en-US" dirty="0" smtClean="0"/>
               <a:t>Refresh the view</a:t>
             </a:r>
-            <a:endParaRPr lang="en-US" dirty="0" smtClean="0"/>
           </a:p>
           <a:p>
             <a:r>
               <a:rPr lang="en-US" dirty="0" smtClean="0"/>
-              <a:t>Architecture </a:t>
-            </a:r>
-            <a:r>
-              <a:rPr lang="en-US" dirty="0" smtClean="0"/>
-              <a:t>review</a:t>
+              <a:t>Architecture review</a:t>
             </a:r>
           </a:p>
           <a:p>

</xml_diff>